<commit_message>
first updates since seminar
</commit_message>
<xml_diff>
--- a/ppts/info_session.pptx
+++ b/ppts/info_session.pptx
@@ -1,31 +1,31 @@
 
 <file path=ppt/presentation.xml><?xml version="1.0" encoding="utf-8"?>
-<p:presentation xmlns:a="http://schemas.openxmlformats.org/drawingml/2006/main" xmlns:r="http://schemas.openxmlformats.org/officeDocument/2006/relationships" xmlns:p="http://schemas.openxmlformats.org/presentationml/2006/main">
+<p:presentation xmlns:a="http://schemas.openxmlformats.org/drawingml/2006/main" xmlns:r="http://schemas.openxmlformats.org/officeDocument/2006/relationships" xmlns:p="http://schemas.openxmlformats.org/presentationml/2006/main" saveSubsetFonts="1">
   <p:sldMasterIdLst>
-    <p:sldMasterId id="2147483648" r:id="rId5"/>
+    <p:sldMasterId id="2147483648" r:id="rId1"/>
   </p:sldMasterIdLst>
   <p:notesMasterIdLst>
-    <p:notesMasterId r:id="rId7"/>
+    <p:notesMasterId r:id="rId20"/>
   </p:notesMasterIdLst>
   <p:sldIdLst>
-    <p:sldId id="256" r:id="rId8"/>
-    <p:sldId id="257" r:id="rId9"/>
-    <p:sldId id="258" r:id="rId10"/>
-    <p:sldId id="259" r:id="rId11"/>
-    <p:sldId id="260" r:id="rId12"/>
-    <p:sldId id="261" r:id="rId13"/>
-    <p:sldId id="262" r:id="rId14"/>
-    <p:sldId id="263" r:id="rId15"/>
-    <p:sldId id="264" r:id="rId16"/>
-    <p:sldId id="265" r:id="rId17"/>
-    <p:sldId id="266" r:id="rId18"/>
-    <p:sldId id="267" r:id="rId19"/>
-    <p:sldId id="268" r:id="rId20"/>
-    <p:sldId id="269" r:id="rId21"/>
-    <p:sldId id="270" r:id="rId22"/>
-    <p:sldId id="271" r:id="rId23"/>
-    <p:sldId id="272" r:id="rId24"/>
-    <p:sldId id="273" r:id="rId25"/>
+    <p:sldId id="256" r:id="rId2"/>
+    <p:sldId id="257" r:id="rId3"/>
+    <p:sldId id="258" r:id="rId4"/>
+    <p:sldId id="259" r:id="rId5"/>
+    <p:sldId id="260" r:id="rId6"/>
+    <p:sldId id="261" r:id="rId7"/>
+    <p:sldId id="262" r:id="rId8"/>
+    <p:sldId id="263" r:id="rId9"/>
+    <p:sldId id="264" r:id="rId10"/>
+    <p:sldId id="265" r:id="rId11"/>
+    <p:sldId id="266" r:id="rId12"/>
+    <p:sldId id="267" r:id="rId13"/>
+    <p:sldId id="268" r:id="rId14"/>
+    <p:sldId id="269" r:id="rId15"/>
+    <p:sldId id="270" r:id="rId16"/>
+    <p:sldId id="271" r:id="rId17"/>
+    <p:sldId id="272" r:id="rId18"/>
+    <p:sldId id="273" r:id="rId19"/>
   </p:sldIdLst>
   <p:sldSz cx="13004800" cy="9753600"/>
   <p:notesSz cx="6858000" cy="9144000"/>
@@ -45,7 +45,7 @@
       <a:buFontTx/>
       <a:buNone/>
       <a:tabLst/>
-      <a:defRPr b="0" baseline="0" cap="none" i="0" spc="0" strike="noStrike" sz="1800" u="none" kumimoji="0" normalizeH="0">
+      <a:defRPr kumimoji="0" sz="1800" b="0" i="0" u="none" strike="noStrike" cap="none" spc="0" normalizeH="0" baseline="0">
         <a:ln>
           <a:noFill/>
         </a:ln>
@@ -71,7 +71,7 @@
       <a:buFontTx/>
       <a:buNone/>
       <a:tabLst/>
-      <a:defRPr b="0" baseline="0" cap="none" i="0" spc="0" strike="noStrike" sz="3600" u="none" kumimoji="0" normalizeH="0">
+      <a:defRPr kumimoji="0" sz="3600" b="0" i="0" u="none" strike="noStrike" cap="none" spc="0" normalizeH="0" baseline="0">
         <a:ln>
           <a:noFill/>
         </a:ln>
@@ -101,7 +101,7 @@
       <a:buFontTx/>
       <a:buNone/>
       <a:tabLst/>
-      <a:defRPr b="0" baseline="0" cap="none" i="0" spc="0" strike="noStrike" sz="3600" u="none" kumimoji="0" normalizeH="0">
+      <a:defRPr kumimoji="0" sz="3600" b="0" i="0" u="none" strike="noStrike" cap="none" spc="0" normalizeH="0" baseline="0">
         <a:ln>
           <a:noFill/>
         </a:ln>
@@ -131,7 +131,7 @@
       <a:buFontTx/>
       <a:buNone/>
       <a:tabLst/>
-      <a:defRPr b="0" baseline="0" cap="none" i="0" spc="0" strike="noStrike" sz="3600" u="none" kumimoji="0" normalizeH="0">
+      <a:defRPr kumimoji="0" sz="3600" b="0" i="0" u="none" strike="noStrike" cap="none" spc="0" normalizeH="0" baseline="0">
         <a:ln>
           <a:noFill/>
         </a:ln>
@@ -161,7 +161,7 @@
       <a:buFontTx/>
       <a:buNone/>
       <a:tabLst/>
-      <a:defRPr b="0" baseline="0" cap="none" i="0" spc="0" strike="noStrike" sz="3600" u="none" kumimoji="0" normalizeH="0">
+      <a:defRPr kumimoji="0" sz="3600" b="0" i="0" u="none" strike="noStrike" cap="none" spc="0" normalizeH="0" baseline="0">
         <a:ln>
           <a:noFill/>
         </a:ln>
@@ -191,7 +191,7 @@
       <a:buFontTx/>
       <a:buNone/>
       <a:tabLst/>
-      <a:defRPr b="0" baseline="0" cap="none" i="0" spc="0" strike="noStrike" sz="3600" u="none" kumimoji="0" normalizeH="0">
+      <a:defRPr kumimoji="0" sz="3600" b="0" i="0" u="none" strike="noStrike" cap="none" spc="0" normalizeH="0" baseline="0">
         <a:ln>
           <a:noFill/>
         </a:ln>
@@ -221,7 +221,7 @@
       <a:buFontTx/>
       <a:buNone/>
       <a:tabLst/>
-      <a:defRPr b="0" baseline="0" cap="none" i="0" spc="0" strike="noStrike" sz="3600" u="none" kumimoji="0" normalizeH="0">
+      <a:defRPr kumimoji="0" sz="3600" b="0" i="0" u="none" strike="noStrike" cap="none" spc="0" normalizeH="0" baseline="0">
         <a:ln>
           <a:noFill/>
         </a:ln>
@@ -251,7 +251,7 @@
       <a:buFontTx/>
       <a:buNone/>
       <a:tabLst/>
-      <a:defRPr b="0" baseline="0" cap="none" i="0" spc="0" strike="noStrike" sz="3600" u="none" kumimoji="0" normalizeH="0">
+      <a:defRPr kumimoji="0" sz="3600" b="0" i="0" u="none" strike="noStrike" cap="none" spc="0" normalizeH="0" baseline="0">
         <a:ln>
           <a:noFill/>
         </a:ln>
@@ -281,7 +281,7 @@
       <a:buFontTx/>
       <a:buNone/>
       <a:tabLst/>
-      <a:defRPr b="0" baseline="0" cap="none" i="0" spc="0" strike="noStrike" sz="3600" u="none" kumimoji="0" normalizeH="0">
+      <a:defRPr kumimoji="0" sz="3600" b="0" i="0" u="none" strike="noStrike" cap="none" spc="0" normalizeH="0" baseline="0">
         <a:ln>
           <a:noFill/>
         </a:ln>
@@ -311,7 +311,7 @@
       <a:buFontTx/>
       <a:buNone/>
       <a:tabLst/>
-      <a:defRPr b="0" baseline="0" cap="none" i="0" spc="0" strike="noStrike" sz="3600" u="none" kumimoji="0" normalizeH="0">
+      <a:defRPr kumimoji="0" sz="3600" b="0" i="0" u="none" strike="noStrike" cap="none" spc="0" normalizeH="0" baseline="0">
         <a:ln>
           <a:noFill/>
         </a:ln>
@@ -330,13 +330,14 @@
 </p:presentation>
 </file>
 
-<file path=ppt/commentAuthors.xml><?xml version="1.0" encoding="utf-8"?>
-<p:cmAuthorLst xmlns:a="http://schemas.openxmlformats.org/drawingml/2006/main" xmlns:r="http://schemas.openxmlformats.org/officeDocument/2006/relationships" xmlns:p="http://schemas.openxmlformats.org/presentationml/2006/main"/>
-</file>
-
 <file path=ppt/notesMasters/notesMaster1.xml><?xml version="1.0" encoding="utf-8"?>
 <p:notesMaster xmlns:a="http://schemas.openxmlformats.org/drawingml/2006/main" xmlns:r="http://schemas.openxmlformats.org/officeDocument/2006/relationships" xmlns:p="http://schemas.openxmlformats.org/presentationml/2006/main">
   <p:cSld>
+    <p:bg>
+      <p:bgRef idx="1001">
+        <a:schemeClr val="bg1"/>
+      </p:bgRef>
+    </p:bg>
     <p:spTree>
       <p:nvGrpSpPr>
         <p:cNvPr id="1" name=""/>
@@ -354,7 +355,9 @@
       <p:sp>
         <p:nvSpPr>
           <p:cNvPr id="116" name="Shape 116"/>
-          <p:cNvSpPr/>
+          <p:cNvSpPr>
+            <a:spLocks noGrp="1" noRot="1" noChangeAspect="1"/>
+          </p:cNvSpPr>
           <p:nvPr>
             <p:ph type="sldImg"/>
           </p:nvPr>
@@ -372,14 +375,16 @@
           <a:bodyPr/>
           <a:lstStyle/>
           <a:p>
-            <a:pPr/>
+            <a:endParaRPr/>
           </a:p>
         </p:txBody>
       </p:sp>
       <p:sp>
         <p:nvSpPr>
           <p:cNvPr id="117" name="Shape 117"/>
-          <p:cNvSpPr/>
+          <p:cNvSpPr>
+            <a:spLocks noGrp="1"/>
+          </p:cNvSpPr>
           <p:nvPr>
             <p:ph type="body" sz="quarter" idx="1"/>
           </p:nvPr>
@@ -397,7 +402,7 @@
           <a:bodyPr/>
           <a:lstStyle/>
           <a:p>
-            <a:pPr/>
+            <a:endParaRPr/>
           </a:p>
         </p:txBody>
       </p:sp>
@@ -509,7 +514,7 @@
 </file>
 
 <file path=ppt/slideLayouts/slideLayout1.xml><?xml version="1.0" encoding="utf-8"?>
-<p:sldLayout xmlns:a="http://schemas.openxmlformats.org/drawingml/2006/main" xmlns:r="http://schemas.openxmlformats.org/officeDocument/2006/relationships" xmlns:p="http://schemas.openxmlformats.org/presentationml/2006/main" type="title" showMasterSp="1" showMasterPhAnim="1">
+<p:sldLayout xmlns:a="http://schemas.openxmlformats.org/drawingml/2006/main" xmlns:r="http://schemas.openxmlformats.org/officeDocument/2006/relationships" xmlns:p="http://schemas.openxmlformats.org/presentationml/2006/main" type="title">
   <p:cSld name="Title &amp; Subtitle">
     <p:spTree>
       <p:nvGrpSpPr>
@@ -528,7 +533,9 @@
       <p:sp>
         <p:nvSpPr>
           <p:cNvPr id="11" name="Shape 11"/>
-          <p:cNvSpPr/>
+          <p:cNvSpPr>
+            <a:spLocks noGrp="1"/>
+          </p:cNvSpPr>
           <p:nvPr>
             <p:ph type="title"/>
           </p:nvPr>
@@ -546,7 +553,6 @@
           <a:bodyPr anchor="b"/>
           <a:lstStyle/>
           <a:p>
-            <a:pPr/>
             <a:r>
               <a:t>Title Text</a:t>
             </a:r>
@@ -556,7 +562,9 @@
       <p:sp>
         <p:nvSpPr>
           <p:cNvPr id="12" name="Shape 12"/>
-          <p:cNvSpPr/>
+          <p:cNvSpPr>
+            <a:spLocks noGrp="1"/>
+          </p:cNvSpPr>
           <p:nvPr>
             <p:ph type="body" sz="quarter" idx="1"/>
           </p:nvPr>
@@ -610,7 +618,6 @@
             </a:lvl5pPr>
           </a:lstStyle>
           <a:p>
-            <a:pPr/>
             <a:r>
               <a:t>Body Level One</a:t>
             </a:r>
@@ -644,7 +651,9 @@
       <p:sp>
         <p:nvSpPr>
           <p:cNvPr id="13" name="Shape 13"/>
-          <p:cNvSpPr/>
+          <p:cNvSpPr>
+            <a:spLocks noGrp="1"/>
+          </p:cNvSpPr>
           <p:nvPr>
             <p:ph type="sldNum" sz="quarter" idx="2"/>
           </p:nvPr>
@@ -658,8 +667,10 @@
           <a:bodyPr/>
           <a:lstStyle/>
           <a:p>
-            <a:pPr/>
-            <a:fld id="{86CB4B4D-7CA3-9044-876B-883B54F8677D}" type="slidenum"/>
+            <a:fld id="{86CB4B4D-7CA3-9044-876B-883B54F8677D}" type="slidenum">
+              <a:t>‹#›</a:t>
+            </a:fld>
+            <a:endParaRPr/>
           </a:p>
         </p:txBody>
       </p:sp>
@@ -668,12 +679,12 @@
   <p:clrMapOvr>
     <a:masterClrMapping/>
   </p:clrMapOvr>
-  <p:transition xmlns:p14="http://schemas.microsoft.com/office/powerpoint/2010/main" spd="med" advClick="1"/>
+  <p:transition spd="med"/>
 </p:sldLayout>
 </file>
 
 <file path=ppt/slideLayouts/slideLayout10.xml><?xml version="1.0" encoding="utf-8"?>
-<p:sldLayout xmlns:a="http://schemas.openxmlformats.org/drawingml/2006/main" xmlns:r="http://schemas.openxmlformats.org/officeDocument/2006/relationships" xmlns:p="http://schemas.openxmlformats.org/presentationml/2006/main" type="tx" showMasterSp="1" showMasterPhAnim="1">
+<p:sldLayout xmlns:a="http://schemas.openxmlformats.org/drawingml/2006/main" xmlns:r="http://schemas.openxmlformats.org/officeDocument/2006/relationships" xmlns:p="http://schemas.openxmlformats.org/presentationml/2006/main" type="tx">
   <p:cSld name="Quote">
     <p:spTree>
       <p:nvGrpSpPr>
@@ -692,7 +703,9 @@
       <p:sp>
         <p:nvSpPr>
           <p:cNvPr id="93" name="Shape 93"/>
-          <p:cNvSpPr/>
+          <p:cNvSpPr>
+            <a:spLocks noGrp="1"/>
+          </p:cNvSpPr>
           <p:nvPr>
             <p:ph type="body" sz="quarter" idx="13"/>
           </p:nvPr>
@@ -721,7 +734,6 @@
             </a:lvl1pPr>
           </a:lstStyle>
           <a:p>
-            <a:pPr/>
             <a:r>
               <a:t>–Johnny Appleseed</a:t>
             </a:r>
@@ -731,7 +743,9 @@
       <p:sp>
         <p:nvSpPr>
           <p:cNvPr id="94" name="Shape 94"/>
-          <p:cNvSpPr/>
+          <p:cNvSpPr>
+            <a:spLocks noGrp="1"/>
+          </p:cNvSpPr>
           <p:nvPr>
             <p:ph type="body" sz="quarter" idx="14"/>
           </p:nvPr>
@@ -759,7 +773,6 @@
             </a:lvl1pPr>
           </a:lstStyle>
           <a:p>
-            <a:pPr/>
             <a:r>
               <a:t>“Type a quote here.”</a:t>
             </a:r>
@@ -769,7 +782,9 @@
       <p:sp>
         <p:nvSpPr>
           <p:cNvPr id="95" name="Shape 95"/>
-          <p:cNvSpPr/>
+          <p:cNvSpPr>
+            <a:spLocks noGrp="1"/>
+          </p:cNvSpPr>
           <p:nvPr>
             <p:ph type="sldNum" sz="quarter" idx="2"/>
           </p:nvPr>
@@ -783,8 +798,10 @@
           <a:bodyPr/>
           <a:lstStyle/>
           <a:p>
-            <a:pPr/>
-            <a:fld id="{86CB4B4D-7CA3-9044-876B-883B54F8677D}" type="slidenum"/>
+            <a:fld id="{86CB4B4D-7CA3-9044-876B-883B54F8677D}" type="slidenum">
+              <a:t>‹#›</a:t>
+            </a:fld>
+            <a:endParaRPr/>
           </a:p>
         </p:txBody>
       </p:sp>
@@ -793,12 +810,12 @@
   <p:clrMapOvr>
     <a:masterClrMapping/>
   </p:clrMapOvr>
-  <p:transition xmlns:p14="http://schemas.microsoft.com/office/powerpoint/2010/main" spd="med" advClick="1"/>
+  <p:transition spd="med"/>
 </p:sldLayout>
 </file>
 
 <file path=ppt/slideLayouts/slideLayout11.xml><?xml version="1.0" encoding="utf-8"?>
-<p:sldLayout xmlns:a="http://schemas.openxmlformats.org/drawingml/2006/main" xmlns:r="http://schemas.openxmlformats.org/officeDocument/2006/relationships" xmlns:p="http://schemas.openxmlformats.org/presentationml/2006/main" type="tx" showMasterSp="1" showMasterPhAnim="1">
+<p:sldLayout xmlns:a="http://schemas.openxmlformats.org/drawingml/2006/main" xmlns:r="http://schemas.openxmlformats.org/officeDocument/2006/relationships" xmlns:p="http://schemas.openxmlformats.org/presentationml/2006/main" type="tx">
   <p:cSld name="Photo">
     <p:spTree>
       <p:nvGrpSpPr>
@@ -817,7 +834,9 @@
       <p:sp>
         <p:nvSpPr>
           <p:cNvPr id="102" name="Shape 102"/>
-          <p:cNvSpPr/>
+          <p:cNvSpPr>
+            <a:spLocks noGrp="1"/>
+          </p:cNvSpPr>
           <p:nvPr>
             <p:ph type="pic" idx="13"/>
           </p:nvPr>
@@ -837,14 +856,16 @@
           </a:bodyPr>
           <a:lstStyle/>
           <a:p>
-            <a:pPr/>
+            <a:endParaRPr/>
           </a:p>
         </p:txBody>
       </p:sp>
       <p:sp>
         <p:nvSpPr>
           <p:cNvPr id="103" name="Shape 103"/>
-          <p:cNvSpPr/>
+          <p:cNvSpPr>
+            <a:spLocks noGrp="1"/>
+          </p:cNvSpPr>
           <p:nvPr>
             <p:ph type="sldNum" sz="quarter" idx="2"/>
           </p:nvPr>
@@ -858,8 +879,10 @@
           <a:bodyPr/>
           <a:lstStyle/>
           <a:p>
-            <a:pPr/>
-            <a:fld id="{86CB4B4D-7CA3-9044-876B-883B54F8677D}" type="slidenum"/>
+            <a:fld id="{86CB4B4D-7CA3-9044-876B-883B54F8677D}" type="slidenum">
+              <a:t>‹#›</a:t>
+            </a:fld>
+            <a:endParaRPr/>
           </a:p>
         </p:txBody>
       </p:sp>
@@ -868,12 +891,12 @@
   <p:clrMapOvr>
     <a:masterClrMapping/>
   </p:clrMapOvr>
-  <p:transition xmlns:p14="http://schemas.microsoft.com/office/powerpoint/2010/main" spd="med" advClick="1"/>
+  <p:transition spd="med"/>
 </p:sldLayout>
 </file>
 
 <file path=ppt/slideLayouts/slideLayout12.xml><?xml version="1.0" encoding="utf-8"?>
-<p:sldLayout xmlns:a="http://schemas.openxmlformats.org/drawingml/2006/main" xmlns:r="http://schemas.openxmlformats.org/officeDocument/2006/relationships" xmlns:p="http://schemas.openxmlformats.org/presentationml/2006/main" type="tx" showMasterSp="1" showMasterPhAnim="1">
+<p:sldLayout xmlns:a="http://schemas.openxmlformats.org/drawingml/2006/main" xmlns:r="http://schemas.openxmlformats.org/officeDocument/2006/relationships" xmlns:p="http://schemas.openxmlformats.org/presentationml/2006/main" type="tx">
   <p:cSld name="Blank">
     <p:spTree>
       <p:nvGrpSpPr>
@@ -892,7 +915,9 @@
       <p:sp>
         <p:nvSpPr>
           <p:cNvPr id="110" name="Shape 110"/>
-          <p:cNvSpPr/>
+          <p:cNvSpPr>
+            <a:spLocks noGrp="1"/>
+          </p:cNvSpPr>
           <p:nvPr>
             <p:ph type="sldNum" sz="quarter" idx="2"/>
           </p:nvPr>
@@ -906,8 +931,10 @@
           <a:bodyPr/>
           <a:lstStyle/>
           <a:p>
-            <a:pPr/>
-            <a:fld id="{86CB4B4D-7CA3-9044-876B-883B54F8677D}" type="slidenum"/>
+            <a:fld id="{86CB4B4D-7CA3-9044-876B-883B54F8677D}" type="slidenum">
+              <a:t>‹#›</a:t>
+            </a:fld>
+            <a:endParaRPr/>
           </a:p>
         </p:txBody>
       </p:sp>
@@ -916,12 +943,12 @@
   <p:clrMapOvr>
     <a:masterClrMapping/>
   </p:clrMapOvr>
-  <p:transition xmlns:p14="http://schemas.microsoft.com/office/powerpoint/2010/main" spd="med" advClick="1"/>
+  <p:transition spd="med"/>
 </p:sldLayout>
 </file>
 
 <file path=ppt/slideLayouts/slideLayout2.xml><?xml version="1.0" encoding="utf-8"?>
-<p:sldLayout xmlns:a="http://schemas.openxmlformats.org/drawingml/2006/main" xmlns:r="http://schemas.openxmlformats.org/officeDocument/2006/relationships" xmlns:p="http://schemas.openxmlformats.org/presentationml/2006/main" type="tx" showMasterSp="1" showMasterPhAnim="1">
+<p:sldLayout xmlns:a="http://schemas.openxmlformats.org/drawingml/2006/main" xmlns:r="http://schemas.openxmlformats.org/officeDocument/2006/relationships" xmlns:p="http://schemas.openxmlformats.org/presentationml/2006/main" type="tx">
   <p:cSld name="Photo - Horizontal">
     <p:spTree>
       <p:nvGrpSpPr>
@@ -940,7 +967,9 @@
       <p:sp>
         <p:nvSpPr>
           <p:cNvPr id="20" name="Shape 20"/>
-          <p:cNvSpPr/>
+          <p:cNvSpPr>
+            <a:spLocks noGrp="1"/>
+          </p:cNvSpPr>
           <p:nvPr>
             <p:ph type="pic" idx="13"/>
           </p:nvPr>
@@ -960,14 +989,16 @@
           </a:bodyPr>
           <a:lstStyle/>
           <a:p>
-            <a:pPr/>
+            <a:endParaRPr/>
           </a:p>
         </p:txBody>
       </p:sp>
       <p:sp>
         <p:nvSpPr>
           <p:cNvPr id="21" name="Shape 21"/>
-          <p:cNvSpPr/>
+          <p:cNvSpPr>
+            <a:spLocks noGrp="1"/>
+          </p:cNvSpPr>
           <p:nvPr>
             <p:ph type="title"/>
           </p:nvPr>
@@ -985,7 +1016,6 @@
           <a:bodyPr/>
           <a:lstStyle/>
           <a:p>
-            <a:pPr/>
             <a:r>
               <a:t>Title Text</a:t>
             </a:r>
@@ -995,7 +1025,9 @@
       <p:sp>
         <p:nvSpPr>
           <p:cNvPr id="22" name="Shape 22"/>
-          <p:cNvSpPr/>
+          <p:cNvSpPr>
+            <a:spLocks noGrp="1"/>
+          </p:cNvSpPr>
           <p:nvPr>
             <p:ph type="body" sz="quarter" idx="1"/>
           </p:nvPr>
@@ -1049,7 +1081,6 @@
             </a:lvl5pPr>
           </a:lstStyle>
           <a:p>
-            <a:pPr/>
             <a:r>
               <a:t>Body Level One</a:t>
             </a:r>
@@ -1083,7 +1114,9 @@
       <p:sp>
         <p:nvSpPr>
           <p:cNvPr id="23" name="Shape 23"/>
-          <p:cNvSpPr/>
+          <p:cNvSpPr>
+            <a:spLocks noGrp="1"/>
+          </p:cNvSpPr>
           <p:nvPr>
             <p:ph type="sldNum" sz="quarter" idx="2"/>
           </p:nvPr>
@@ -1097,8 +1130,10 @@
           <a:bodyPr/>
           <a:lstStyle/>
           <a:p>
-            <a:pPr/>
-            <a:fld id="{86CB4B4D-7CA3-9044-876B-883B54F8677D}" type="slidenum"/>
+            <a:fld id="{86CB4B4D-7CA3-9044-876B-883B54F8677D}" type="slidenum">
+              <a:t>‹#›</a:t>
+            </a:fld>
+            <a:endParaRPr/>
           </a:p>
         </p:txBody>
       </p:sp>
@@ -1107,12 +1142,12 @@
   <p:clrMapOvr>
     <a:masterClrMapping/>
   </p:clrMapOvr>
-  <p:transition xmlns:p14="http://schemas.microsoft.com/office/powerpoint/2010/main" spd="med" advClick="1"/>
+  <p:transition spd="med"/>
 </p:sldLayout>
 </file>
 
 <file path=ppt/slideLayouts/slideLayout3.xml><?xml version="1.0" encoding="utf-8"?>
-<p:sldLayout xmlns:a="http://schemas.openxmlformats.org/drawingml/2006/main" xmlns:r="http://schemas.openxmlformats.org/officeDocument/2006/relationships" xmlns:p="http://schemas.openxmlformats.org/presentationml/2006/main" type="tx" showMasterSp="1" showMasterPhAnim="1">
+<p:sldLayout xmlns:a="http://schemas.openxmlformats.org/drawingml/2006/main" xmlns:r="http://schemas.openxmlformats.org/officeDocument/2006/relationships" xmlns:p="http://schemas.openxmlformats.org/presentationml/2006/main" type="tx">
   <p:cSld name="Title - Center">
     <p:spTree>
       <p:nvGrpSpPr>
@@ -1131,7 +1166,9 @@
       <p:sp>
         <p:nvSpPr>
           <p:cNvPr id="30" name="Shape 30"/>
-          <p:cNvSpPr/>
+          <p:cNvSpPr>
+            <a:spLocks noGrp="1"/>
+          </p:cNvSpPr>
           <p:nvPr>
             <p:ph type="title"/>
           </p:nvPr>
@@ -1149,7 +1186,6 @@
           <a:bodyPr/>
           <a:lstStyle/>
           <a:p>
-            <a:pPr/>
             <a:r>
               <a:t>Title Text</a:t>
             </a:r>
@@ -1159,7 +1195,9 @@
       <p:sp>
         <p:nvSpPr>
           <p:cNvPr id="31" name="Shape 31"/>
-          <p:cNvSpPr/>
+          <p:cNvSpPr>
+            <a:spLocks noGrp="1"/>
+          </p:cNvSpPr>
           <p:nvPr>
             <p:ph type="sldNum" sz="quarter" idx="2"/>
           </p:nvPr>
@@ -1173,8 +1211,10 @@
           <a:bodyPr/>
           <a:lstStyle/>
           <a:p>
-            <a:pPr/>
-            <a:fld id="{86CB4B4D-7CA3-9044-876B-883B54F8677D}" type="slidenum"/>
+            <a:fld id="{86CB4B4D-7CA3-9044-876B-883B54F8677D}" type="slidenum">
+              <a:t>‹#›</a:t>
+            </a:fld>
+            <a:endParaRPr/>
           </a:p>
         </p:txBody>
       </p:sp>
@@ -1183,12 +1223,12 @@
   <p:clrMapOvr>
     <a:masterClrMapping/>
   </p:clrMapOvr>
-  <p:transition xmlns:p14="http://schemas.microsoft.com/office/powerpoint/2010/main" spd="med" advClick="1"/>
+  <p:transition spd="med"/>
 </p:sldLayout>
 </file>
 
 <file path=ppt/slideLayouts/slideLayout4.xml><?xml version="1.0" encoding="utf-8"?>
-<p:sldLayout xmlns:a="http://schemas.openxmlformats.org/drawingml/2006/main" xmlns:r="http://schemas.openxmlformats.org/officeDocument/2006/relationships" xmlns:p="http://schemas.openxmlformats.org/presentationml/2006/main" type="tx" showMasterSp="1" showMasterPhAnim="1">
+<p:sldLayout xmlns:a="http://schemas.openxmlformats.org/drawingml/2006/main" xmlns:r="http://schemas.openxmlformats.org/officeDocument/2006/relationships" xmlns:p="http://schemas.openxmlformats.org/presentationml/2006/main" type="tx">
   <p:cSld name="Photo - Vertical">
     <p:spTree>
       <p:nvGrpSpPr>
@@ -1207,7 +1247,9 @@
       <p:sp>
         <p:nvSpPr>
           <p:cNvPr id="38" name="Shape 38"/>
-          <p:cNvSpPr/>
+          <p:cNvSpPr>
+            <a:spLocks noGrp="1"/>
+          </p:cNvSpPr>
           <p:nvPr>
             <p:ph type="pic" sz="half" idx="13"/>
           </p:nvPr>
@@ -1227,14 +1269,16 @@
           </a:bodyPr>
           <a:lstStyle/>
           <a:p>
-            <a:pPr/>
+            <a:endParaRPr/>
           </a:p>
         </p:txBody>
       </p:sp>
       <p:sp>
         <p:nvSpPr>
           <p:cNvPr id="39" name="Shape 39"/>
-          <p:cNvSpPr/>
+          <p:cNvSpPr>
+            <a:spLocks noGrp="1"/>
+          </p:cNvSpPr>
           <p:nvPr>
             <p:ph type="title"/>
           </p:nvPr>
@@ -1252,7 +1296,6 @@
           <a:bodyPr anchor="b"/>
           <a:lstStyle/>
           <a:p>
-            <a:pPr/>
             <a:r>
               <a:t>Title Text</a:t>
             </a:r>
@@ -1262,7 +1305,9 @@
       <p:sp>
         <p:nvSpPr>
           <p:cNvPr id="40" name="Shape 40"/>
-          <p:cNvSpPr/>
+          <p:cNvSpPr>
+            <a:spLocks noGrp="1"/>
+          </p:cNvSpPr>
           <p:nvPr>
             <p:ph type="body" sz="quarter" idx="1"/>
           </p:nvPr>
@@ -1316,7 +1361,6 @@
             </a:lvl5pPr>
           </a:lstStyle>
           <a:p>
-            <a:pPr/>
             <a:r>
               <a:t>Body Level One</a:t>
             </a:r>
@@ -1350,7 +1394,9 @@
       <p:sp>
         <p:nvSpPr>
           <p:cNvPr id="41" name="Shape 41"/>
-          <p:cNvSpPr/>
+          <p:cNvSpPr>
+            <a:spLocks noGrp="1"/>
+          </p:cNvSpPr>
           <p:nvPr>
             <p:ph type="sldNum" sz="quarter" idx="2"/>
           </p:nvPr>
@@ -1364,8 +1410,10 @@
           <a:bodyPr/>
           <a:lstStyle/>
           <a:p>
-            <a:pPr/>
-            <a:fld id="{86CB4B4D-7CA3-9044-876B-883B54F8677D}" type="slidenum"/>
+            <a:fld id="{86CB4B4D-7CA3-9044-876B-883B54F8677D}" type="slidenum">
+              <a:t>‹#›</a:t>
+            </a:fld>
+            <a:endParaRPr/>
           </a:p>
         </p:txBody>
       </p:sp>
@@ -1374,12 +1422,12 @@
   <p:clrMapOvr>
     <a:masterClrMapping/>
   </p:clrMapOvr>
-  <p:transition xmlns:p14="http://schemas.microsoft.com/office/powerpoint/2010/main" spd="med" advClick="1"/>
+  <p:transition spd="med"/>
 </p:sldLayout>
 </file>
 
 <file path=ppt/slideLayouts/slideLayout5.xml><?xml version="1.0" encoding="utf-8"?>
-<p:sldLayout xmlns:a="http://schemas.openxmlformats.org/drawingml/2006/main" xmlns:r="http://schemas.openxmlformats.org/officeDocument/2006/relationships" xmlns:p="http://schemas.openxmlformats.org/presentationml/2006/main" type="tx" showMasterSp="1" showMasterPhAnim="1">
+<p:sldLayout xmlns:a="http://schemas.openxmlformats.org/drawingml/2006/main" xmlns:r="http://schemas.openxmlformats.org/officeDocument/2006/relationships" xmlns:p="http://schemas.openxmlformats.org/presentationml/2006/main" type="tx">
   <p:cSld name="Title - Top">
     <p:spTree>
       <p:nvGrpSpPr>
@@ -1398,7 +1446,9 @@
       <p:sp>
         <p:nvSpPr>
           <p:cNvPr id="48" name="Shape 48"/>
-          <p:cNvSpPr/>
+          <p:cNvSpPr>
+            <a:spLocks noGrp="1"/>
+          </p:cNvSpPr>
           <p:nvPr>
             <p:ph type="title"/>
           </p:nvPr>
@@ -1412,7 +1462,6 @@
           <a:bodyPr/>
           <a:lstStyle/>
           <a:p>
-            <a:pPr/>
             <a:r>
               <a:t>Title Text</a:t>
             </a:r>
@@ -1422,7 +1471,9 @@
       <p:sp>
         <p:nvSpPr>
           <p:cNvPr id="49" name="Shape 49"/>
-          <p:cNvSpPr/>
+          <p:cNvSpPr>
+            <a:spLocks noGrp="1"/>
+          </p:cNvSpPr>
           <p:nvPr>
             <p:ph type="sldNum" sz="quarter" idx="2"/>
           </p:nvPr>
@@ -1436,8 +1487,10 @@
           <a:bodyPr/>
           <a:lstStyle/>
           <a:p>
-            <a:pPr/>
-            <a:fld id="{86CB4B4D-7CA3-9044-876B-883B54F8677D}" type="slidenum"/>
+            <a:fld id="{86CB4B4D-7CA3-9044-876B-883B54F8677D}" type="slidenum">
+              <a:t>‹#›</a:t>
+            </a:fld>
+            <a:endParaRPr/>
           </a:p>
         </p:txBody>
       </p:sp>
@@ -1446,12 +1499,12 @@
   <p:clrMapOvr>
     <a:masterClrMapping/>
   </p:clrMapOvr>
-  <p:transition xmlns:p14="http://schemas.microsoft.com/office/powerpoint/2010/main" spd="med" advClick="1"/>
+  <p:transition spd="med"/>
 </p:sldLayout>
 </file>
 
 <file path=ppt/slideLayouts/slideLayout6.xml><?xml version="1.0" encoding="utf-8"?>
-<p:sldLayout xmlns:a="http://schemas.openxmlformats.org/drawingml/2006/main" xmlns:r="http://schemas.openxmlformats.org/officeDocument/2006/relationships" xmlns:p="http://schemas.openxmlformats.org/presentationml/2006/main" type="tx" showMasterSp="1" showMasterPhAnim="1">
+<p:sldLayout xmlns:a="http://schemas.openxmlformats.org/drawingml/2006/main" xmlns:r="http://schemas.openxmlformats.org/officeDocument/2006/relationships" xmlns:p="http://schemas.openxmlformats.org/presentationml/2006/main" type="tx">
   <p:cSld name="Title &amp; Bullets">
     <p:spTree>
       <p:nvGrpSpPr>
@@ -1470,7 +1523,9 @@
       <p:sp>
         <p:nvSpPr>
           <p:cNvPr id="56" name="Shape 56"/>
-          <p:cNvSpPr/>
+          <p:cNvSpPr>
+            <a:spLocks noGrp="1"/>
+          </p:cNvSpPr>
           <p:nvPr>
             <p:ph type="title"/>
           </p:nvPr>
@@ -1484,7 +1539,6 @@
           <a:bodyPr/>
           <a:lstStyle/>
           <a:p>
-            <a:pPr/>
             <a:r>
               <a:t>Title Text</a:t>
             </a:r>
@@ -1494,7 +1548,9 @@
       <p:sp>
         <p:nvSpPr>
           <p:cNvPr id="57" name="Shape 57"/>
-          <p:cNvSpPr/>
+          <p:cNvSpPr>
+            <a:spLocks noGrp="1"/>
+          </p:cNvSpPr>
           <p:nvPr>
             <p:ph type="body" idx="1"/>
           </p:nvPr>
@@ -1554,7 +1610,6 @@
             </a:lvl5pPr>
           </a:lstStyle>
           <a:p>
-            <a:pPr/>
             <a:r>
               <a:t>Body Level One</a:t>
             </a:r>
@@ -1588,7 +1643,9 @@
       <p:sp>
         <p:nvSpPr>
           <p:cNvPr id="58" name="Shape 58"/>
-          <p:cNvSpPr/>
+          <p:cNvSpPr>
+            <a:spLocks noGrp="1"/>
+          </p:cNvSpPr>
           <p:nvPr>
             <p:ph type="sldNum" sz="quarter" idx="2"/>
           </p:nvPr>
@@ -1602,8 +1659,10 @@
           <a:bodyPr/>
           <a:lstStyle/>
           <a:p>
-            <a:pPr/>
-            <a:fld id="{86CB4B4D-7CA3-9044-876B-883B54F8677D}" type="slidenum"/>
+            <a:fld id="{86CB4B4D-7CA3-9044-876B-883B54F8677D}" type="slidenum">
+              <a:t>‹#›</a:t>
+            </a:fld>
+            <a:endParaRPr/>
           </a:p>
         </p:txBody>
       </p:sp>
@@ -1612,12 +1671,12 @@
   <p:clrMapOvr>
     <a:masterClrMapping/>
   </p:clrMapOvr>
-  <p:transition xmlns:p14="http://schemas.microsoft.com/office/powerpoint/2010/main" spd="med" advClick="1"/>
+  <p:transition spd="med"/>
 </p:sldLayout>
 </file>
 
 <file path=ppt/slideLayouts/slideLayout7.xml><?xml version="1.0" encoding="utf-8"?>
-<p:sldLayout xmlns:a="http://schemas.openxmlformats.org/drawingml/2006/main" xmlns:r="http://schemas.openxmlformats.org/officeDocument/2006/relationships" xmlns:p="http://schemas.openxmlformats.org/presentationml/2006/main" type="tx" showMasterSp="1" showMasterPhAnim="1">
+<p:sldLayout xmlns:a="http://schemas.openxmlformats.org/drawingml/2006/main" xmlns:r="http://schemas.openxmlformats.org/officeDocument/2006/relationships" xmlns:p="http://schemas.openxmlformats.org/presentationml/2006/main" type="tx">
   <p:cSld name="Title, Bullets &amp; Photo">
     <p:spTree>
       <p:nvGrpSpPr>
@@ -1636,7 +1695,9 @@
       <p:sp>
         <p:nvSpPr>
           <p:cNvPr id="65" name="Shape 65"/>
-          <p:cNvSpPr/>
+          <p:cNvSpPr>
+            <a:spLocks noGrp="1"/>
+          </p:cNvSpPr>
           <p:nvPr>
             <p:ph type="pic" sz="half" idx="13"/>
           </p:nvPr>
@@ -1656,14 +1717,16 @@
           </a:bodyPr>
           <a:lstStyle/>
           <a:p>
-            <a:pPr/>
+            <a:endParaRPr/>
           </a:p>
         </p:txBody>
       </p:sp>
       <p:sp>
         <p:nvSpPr>
           <p:cNvPr id="66" name="Shape 66"/>
-          <p:cNvSpPr/>
+          <p:cNvSpPr>
+            <a:spLocks noGrp="1"/>
+          </p:cNvSpPr>
           <p:nvPr>
             <p:ph type="title"/>
           </p:nvPr>
@@ -1677,7 +1740,6 @@
           <a:bodyPr/>
           <a:lstStyle/>
           <a:p>
-            <a:pPr/>
             <a:r>
               <a:t>Title Text</a:t>
             </a:r>
@@ -1687,7 +1749,9 @@
       <p:sp>
         <p:nvSpPr>
           <p:cNvPr id="67" name="Shape 67"/>
-          <p:cNvSpPr/>
+          <p:cNvSpPr>
+            <a:spLocks noGrp="1"/>
+          </p:cNvSpPr>
           <p:nvPr>
             <p:ph type="body" sz="half" idx="1"/>
           </p:nvPr>
@@ -1705,7 +1769,6 @@
           <a:bodyPr/>
           <a:lstStyle/>
           <a:p>
-            <a:pPr/>
             <a:r>
               <a:t>Body Level One</a:t>
             </a:r>
@@ -1739,7 +1802,9 @@
       <p:sp>
         <p:nvSpPr>
           <p:cNvPr id="68" name="Shape 68"/>
-          <p:cNvSpPr/>
+          <p:cNvSpPr>
+            <a:spLocks noGrp="1"/>
+          </p:cNvSpPr>
           <p:nvPr>
             <p:ph type="sldNum" sz="quarter" idx="2"/>
           </p:nvPr>
@@ -1753,8 +1818,10 @@
           <a:bodyPr/>
           <a:lstStyle/>
           <a:p>
-            <a:pPr/>
-            <a:fld id="{86CB4B4D-7CA3-9044-876B-883B54F8677D}" type="slidenum"/>
+            <a:fld id="{86CB4B4D-7CA3-9044-876B-883B54F8677D}" type="slidenum">
+              <a:t>‹#›</a:t>
+            </a:fld>
+            <a:endParaRPr/>
           </a:p>
         </p:txBody>
       </p:sp>
@@ -1763,12 +1830,12 @@
   <p:clrMapOvr>
     <a:masterClrMapping/>
   </p:clrMapOvr>
-  <p:transition xmlns:p14="http://schemas.microsoft.com/office/powerpoint/2010/main" spd="med" advClick="1"/>
+  <p:transition spd="med"/>
 </p:sldLayout>
 </file>
 
 <file path=ppt/slideLayouts/slideLayout8.xml><?xml version="1.0" encoding="utf-8"?>
-<p:sldLayout xmlns:a="http://schemas.openxmlformats.org/drawingml/2006/main" xmlns:r="http://schemas.openxmlformats.org/officeDocument/2006/relationships" xmlns:p="http://schemas.openxmlformats.org/presentationml/2006/main" type="tx" showMasterSp="1" showMasterPhAnim="1">
+<p:sldLayout xmlns:a="http://schemas.openxmlformats.org/drawingml/2006/main" xmlns:r="http://schemas.openxmlformats.org/officeDocument/2006/relationships" xmlns:p="http://schemas.openxmlformats.org/presentationml/2006/main" type="tx">
   <p:cSld name="Bullets">
     <p:spTree>
       <p:nvGrpSpPr>
@@ -1787,7 +1854,9 @@
       <p:sp>
         <p:nvSpPr>
           <p:cNvPr id="75" name="Shape 75"/>
-          <p:cNvSpPr/>
+          <p:cNvSpPr>
+            <a:spLocks noGrp="1"/>
+          </p:cNvSpPr>
           <p:nvPr>
             <p:ph type="body" idx="1"/>
           </p:nvPr>
@@ -1851,7 +1920,6 @@
             </a:lvl5pPr>
           </a:lstStyle>
           <a:p>
-            <a:pPr/>
             <a:r>
               <a:t>Body Level One</a:t>
             </a:r>
@@ -1885,7 +1953,9 @@
       <p:sp>
         <p:nvSpPr>
           <p:cNvPr id="76" name="Shape 76"/>
-          <p:cNvSpPr/>
+          <p:cNvSpPr>
+            <a:spLocks noGrp="1"/>
+          </p:cNvSpPr>
           <p:nvPr>
             <p:ph type="sldNum" sz="quarter" idx="2"/>
           </p:nvPr>
@@ -1899,8 +1969,10 @@
           <a:bodyPr/>
           <a:lstStyle/>
           <a:p>
-            <a:pPr/>
-            <a:fld id="{86CB4B4D-7CA3-9044-876B-883B54F8677D}" type="slidenum"/>
+            <a:fld id="{86CB4B4D-7CA3-9044-876B-883B54F8677D}" type="slidenum">
+              <a:t>‹#›</a:t>
+            </a:fld>
+            <a:endParaRPr/>
           </a:p>
         </p:txBody>
       </p:sp>
@@ -1909,12 +1981,12 @@
   <p:clrMapOvr>
     <a:masterClrMapping/>
   </p:clrMapOvr>
-  <p:transition xmlns:p14="http://schemas.microsoft.com/office/powerpoint/2010/main" spd="med" advClick="1"/>
+  <p:transition spd="med"/>
 </p:sldLayout>
 </file>
 
 <file path=ppt/slideLayouts/slideLayout9.xml><?xml version="1.0" encoding="utf-8"?>
-<p:sldLayout xmlns:a="http://schemas.openxmlformats.org/drawingml/2006/main" xmlns:r="http://schemas.openxmlformats.org/officeDocument/2006/relationships" xmlns:p="http://schemas.openxmlformats.org/presentationml/2006/main" type="tx" showMasterSp="1" showMasterPhAnim="1">
+<p:sldLayout xmlns:a="http://schemas.openxmlformats.org/drawingml/2006/main" xmlns:r="http://schemas.openxmlformats.org/officeDocument/2006/relationships" xmlns:p="http://schemas.openxmlformats.org/presentationml/2006/main" type="tx">
   <p:cSld name="Photo - 3 Up">
     <p:spTree>
       <p:nvGrpSpPr>
@@ -1933,7 +2005,9 @@
       <p:sp>
         <p:nvSpPr>
           <p:cNvPr id="83" name="Shape 83"/>
-          <p:cNvSpPr/>
+          <p:cNvSpPr>
+            <a:spLocks noGrp="1"/>
+          </p:cNvSpPr>
           <p:nvPr>
             <p:ph type="pic" sz="quarter" idx="13"/>
           </p:nvPr>
@@ -1953,14 +2027,16 @@
           </a:bodyPr>
           <a:lstStyle/>
           <a:p>
-            <a:pPr/>
+            <a:endParaRPr/>
           </a:p>
         </p:txBody>
       </p:sp>
       <p:sp>
         <p:nvSpPr>
           <p:cNvPr id="84" name="Shape 84"/>
-          <p:cNvSpPr/>
+          <p:cNvSpPr>
+            <a:spLocks noGrp="1"/>
+          </p:cNvSpPr>
           <p:nvPr>
             <p:ph type="pic" sz="quarter" idx="14"/>
           </p:nvPr>
@@ -1980,14 +2056,16 @@
           </a:bodyPr>
           <a:lstStyle/>
           <a:p>
-            <a:pPr/>
+            <a:endParaRPr/>
           </a:p>
         </p:txBody>
       </p:sp>
       <p:sp>
         <p:nvSpPr>
           <p:cNvPr id="85" name="Shape 85"/>
-          <p:cNvSpPr/>
+          <p:cNvSpPr>
+            <a:spLocks noGrp="1"/>
+          </p:cNvSpPr>
           <p:nvPr>
             <p:ph type="pic" idx="15"/>
           </p:nvPr>
@@ -2007,14 +2085,16 @@
           </a:bodyPr>
           <a:lstStyle/>
           <a:p>
-            <a:pPr/>
+            <a:endParaRPr/>
           </a:p>
         </p:txBody>
       </p:sp>
       <p:sp>
         <p:nvSpPr>
           <p:cNvPr id="86" name="Shape 86"/>
-          <p:cNvSpPr/>
+          <p:cNvSpPr>
+            <a:spLocks noGrp="1"/>
+          </p:cNvSpPr>
           <p:nvPr>
             <p:ph type="sldNum" sz="quarter" idx="2"/>
           </p:nvPr>
@@ -2028,8 +2108,10 @@
           <a:bodyPr/>
           <a:lstStyle/>
           <a:p>
-            <a:pPr/>
-            <a:fld id="{86CB4B4D-7CA3-9044-876B-883B54F8677D}" type="slidenum"/>
+            <a:fld id="{86CB4B4D-7CA3-9044-876B-883B54F8677D}" type="slidenum">
+              <a:t>‹#›</a:t>
+            </a:fld>
+            <a:endParaRPr/>
           </a:p>
         </p:txBody>
       </p:sp>
@@ -2038,7 +2120,7 @@
   <p:clrMapOvr>
     <a:masterClrMapping/>
   </p:clrMapOvr>
-  <p:transition xmlns:p14="http://schemas.microsoft.com/office/powerpoint/2010/main" spd="med" advClick="1"/>
+  <p:transition spd="med"/>
 </p:sldLayout>
 </file>
 
@@ -2048,12 +2130,13 @@
     <p:bg>
       <p:bgPr>
         <a:blipFill rotWithShape="1">
-          <a:blip r:embed="rId2"/>
-          <a:srcRect l="0" t="0" r="0" b="0"/>
+          <a:blip r:embed="rId14"/>
+          <a:srcRect/>
           <a:stretch>
             <a:fillRect/>
           </a:stretch>
         </a:blipFill>
+        <a:effectLst/>
       </p:bgPr>
     </p:bg>
     <p:spTree>
@@ -2073,7 +2156,9 @@
       <p:sp>
         <p:nvSpPr>
           <p:cNvPr id="2" name="Shape 2"/>
-          <p:cNvSpPr/>
+          <p:cNvSpPr>
+            <a:spLocks noGrp="1"/>
+          </p:cNvSpPr>
           <p:nvPr>
             <p:ph type="title"/>
           </p:nvPr>
@@ -2097,11 +2182,10 @@
         </p:spPr>
         <p:txBody>
           <a:bodyPr lIns="50800" tIns="50800" rIns="50800" bIns="50800" anchor="ctr">
-            <a:normAutofit fontScale="100000" lnSpcReduction="0"/>
+            <a:normAutofit/>
           </a:bodyPr>
           <a:lstStyle/>
           <a:p>
-            <a:pPr/>
             <a:r>
               <a:t>Title Text</a:t>
             </a:r>
@@ -2111,7 +2195,9 @@
       <p:sp>
         <p:nvSpPr>
           <p:cNvPr id="3" name="Shape 3"/>
-          <p:cNvSpPr/>
+          <p:cNvSpPr>
+            <a:spLocks noGrp="1"/>
+          </p:cNvSpPr>
           <p:nvPr>
             <p:ph type="body" idx="1"/>
           </p:nvPr>
@@ -2135,11 +2221,10 @@
         </p:spPr>
         <p:txBody>
           <a:bodyPr lIns="50800" tIns="50800" rIns="50800" bIns="50800" anchor="ctr">
-            <a:normAutofit fontScale="100000" lnSpcReduction="0"/>
+            <a:normAutofit/>
           </a:bodyPr>
           <a:lstStyle/>
           <a:p>
-            <a:pPr/>
             <a:r>
               <a:t>Body Level One</a:t>
             </a:r>
@@ -2173,7 +2258,9 @@
       <p:sp>
         <p:nvSpPr>
           <p:cNvPr id="4" name="Shape 4"/>
-          <p:cNvSpPr/>
+          <p:cNvSpPr>
+            <a:spLocks noGrp="1"/>
+          </p:cNvSpPr>
           <p:nvPr>
             <p:ph type="sldNum" sz="quarter" idx="2"/>
           </p:nvPr>
@@ -2200,8 +2287,10 @@
             </a:lvl1pPr>
           </a:lstStyle>
           <a:p>
-            <a:pPr/>
-            <a:fld id="{86CB4B4D-7CA3-9044-876B-883B54F8677D}" type="slidenum"/>
+            <a:fld id="{86CB4B4D-7CA3-9044-876B-883B54F8677D}" type="slidenum">
+              <a:t>‹#›</a:t>
+            </a:fld>
+            <a:endParaRPr/>
           </a:p>
         </p:txBody>
       </p:sp>
@@ -2209,20 +2298,20 @@
   </p:cSld>
   <p:clrMap bg1="lt1" tx1="dk1" bg2="lt2" tx2="dk2" accent1="accent1" accent2="accent2" accent3="accent3" accent4="accent4" accent5="accent5" accent6="accent6" hlink="hlink" folHlink="folHlink"/>
   <p:sldLayoutIdLst>
-    <p:sldLayoutId id="2147483649" r:id="rId3"/>
-    <p:sldLayoutId id="2147483650" r:id="rId4"/>
-    <p:sldLayoutId id="2147483651" r:id="rId5"/>
-    <p:sldLayoutId id="2147483652" r:id="rId6"/>
-    <p:sldLayoutId id="2147483653" r:id="rId7"/>
-    <p:sldLayoutId id="2147483654" r:id="rId8"/>
-    <p:sldLayoutId id="2147483655" r:id="rId9"/>
-    <p:sldLayoutId id="2147483656" r:id="rId10"/>
-    <p:sldLayoutId id="2147483657" r:id="rId11"/>
-    <p:sldLayoutId id="2147483658" r:id="rId12"/>
-    <p:sldLayoutId id="2147483659" r:id="rId13"/>
-    <p:sldLayoutId id="2147483660" r:id="rId14"/>
+    <p:sldLayoutId id="2147483649" r:id="rId1"/>
+    <p:sldLayoutId id="2147483650" r:id="rId2"/>
+    <p:sldLayoutId id="2147483651" r:id="rId3"/>
+    <p:sldLayoutId id="2147483652" r:id="rId4"/>
+    <p:sldLayoutId id="2147483653" r:id="rId5"/>
+    <p:sldLayoutId id="2147483654" r:id="rId6"/>
+    <p:sldLayoutId id="2147483655" r:id="rId7"/>
+    <p:sldLayoutId id="2147483656" r:id="rId8"/>
+    <p:sldLayoutId id="2147483657" r:id="rId9"/>
+    <p:sldLayoutId id="2147483658" r:id="rId10"/>
+    <p:sldLayoutId id="2147483659" r:id="rId11"/>
+    <p:sldLayoutId id="2147483660" r:id="rId12"/>
   </p:sldLayoutIdLst>
-  <p:transition xmlns:p14="http://schemas.microsoft.com/office/powerpoint/2010/main" spd="med" advClick="1"/>
+  <p:transition spd="med"/>
   <p:txStyles>
     <p:titleStyle>
       <a:lvl1pPr marL="0" marR="0" indent="0" algn="ctr" defTabSz="584200" rtl="0" latinLnBrk="0">
@@ -2240,7 +2329,7 @@
         <a:buFontTx/>
         <a:buNone/>
         <a:tabLst/>
-        <a:defRPr b="0" baseline="0" cap="all" i="0" spc="0" strike="noStrike" sz="7200" u="none">
+        <a:defRPr sz="7200" b="0" i="0" u="none" strike="noStrike" cap="all" spc="0" baseline="0">
           <a:ln>
             <a:noFill/>
           </a:ln>
@@ -2269,7 +2358,7 @@
         <a:buFontTx/>
         <a:buNone/>
         <a:tabLst/>
-        <a:defRPr b="0" baseline="0" cap="all" i="0" spc="0" strike="noStrike" sz="7200" u="none">
+        <a:defRPr sz="7200" b="0" i="0" u="none" strike="noStrike" cap="all" spc="0" baseline="0">
           <a:ln>
             <a:noFill/>
           </a:ln>
@@ -2298,7 +2387,7 @@
         <a:buFontTx/>
         <a:buNone/>
         <a:tabLst/>
-        <a:defRPr b="0" baseline="0" cap="all" i="0" spc="0" strike="noStrike" sz="7200" u="none">
+        <a:defRPr sz="7200" b="0" i="0" u="none" strike="noStrike" cap="all" spc="0" baseline="0">
           <a:ln>
             <a:noFill/>
           </a:ln>
@@ -2327,7 +2416,7 @@
         <a:buFontTx/>
         <a:buNone/>
         <a:tabLst/>
-        <a:defRPr b="0" baseline="0" cap="all" i="0" spc="0" strike="noStrike" sz="7200" u="none">
+        <a:defRPr sz="7200" b="0" i="0" u="none" strike="noStrike" cap="all" spc="0" baseline="0">
           <a:ln>
             <a:noFill/>
           </a:ln>
@@ -2356,7 +2445,7 @@
         <a:buFontTx/>
         <a:buNone/>
         <a:tabLst/>
-        <a:defRPr b="0" baseline="0" cap="all" i="0" spc="0" strike="noStrike" sz="7200" u="none">
+        <a:defRPr sz="7200" b="0" i="0" u="none" strike="noStrike" cap="all" spc="0" baseline="0">
           <a:ln>
             <a:noFill/>
           </a:ln>
@@ -2385,7 +2474,7 @@
         <a:buFontTx/>
         <a:buNone/>
         <a:tabLst/>
-        <a:defRPr b="0" baseline="0" cap="all" i="0" spc="0" strike="noStrike" sz="7200" u="none">
+        <a:defRPr sz="7200" b="0" i="0" u="none" strike="noStrike" cap="all" spc="0" baseline="0">
           <a:ln>
             <a:noFill/>
           </a:ln>
@@ -2414,7 +2503,7 @@
         <a:buFontTx/>
         <a:buNone/>
         <a:tabLst/>
-        <a:defRPr b="0" baseline="0" cap="all" i="0" spc="0" strike="noStrike" sz="7200" u="none">
+        <a:defRPr sz="7200" b="0" i="0" u="none" strike="noStrike" cap="all" spc="0" baseline="0">
           <a:ln>
             <a:noFill/>
           </a:ln>
@@ -2443,7 +2532,7 @@
         <a:buFontTx/>
         <a:buNone/>
         <a:tabLst/>
-        <a:defRPr b="0" baseline="0" cap="all" i="0" spc="0" strike="noStrike" sz="7200" u="none">
+        <a:defRPr sz="7200" b="0" i="0" u="none" strike="noStrike" cap="all" spc="0" baseline="0">
           <a:ln>
             <a:noFill/>
           </a:ln>
@@ -2472,7 +2561,7 @@
         <a:buFontTx/>
         <a:buNone/>
         <a:tabLst/>
-        <a:defRPr b="0" baseline="0" cap="all" i="0" spc="0" strike="noStrike" sz="7200" u="none">
+        <a:defRPr sz="7200" b="0" i="0" u="none" strike="noStrike" cap="all" spc="0" baseline="0">
           <a:ln>
             <a:noFill/>
           </a:ln>
@@ -2503,7 +2592,7 @@
         <a:buFontTx/>
         <a:buChar char="•"/>
         <a:tabLst/>
-        <a:defRPr b="0" baseline="0" cap="none" i="0" spc="0" strike="noStrike" sz="3800" u="none">
+        <a:defRPr sz="3800" b="0" i="0" u="none" strike="noStrike" cap="none" spc="0" baseline="0">
           <a:ln>
             <a:noFill/>
           </a:ln>
@@ -2532,7 +2621,7 @@
         <a:buFontTx/>
         <a:buChar char="•"/>
         <a:tabLst/>
-        <a:defRPr b="0" baseline="0" cap="none" i="0" spc="0" strike="noStrike" sz="3800" u="none">
+        <a:defRPr sz="3800" b="0" i="0" u="none" strike="noStrike" cap="none" spc="0" baseline="0">
           <a:ln>
             <a:noFill/>
           </a:ln>
@@ -2561,7 +2650,7 @@
         <a:buFontTx/>
         <a:buChar char="•"/>
         <a:tabLst/>
-        <a:defRPr b="0" baseline="0" cap="none" i="0" spc="0" strike="noStrike" sz="3800" u="none">
+        <a:defRPr sz="3800" b="0" i="0" u="none" strike="noStrike" cap="none" spc="0" baseline="0">
           <a:ln>
             <a:noFill/>
           </a:ln>
@@ -2590,7 +2679,7 @@
         <a:buFontTx/>
         <a:buChar char="•"/>
         <a:tabLst/>
-        <a:defRPr b="0" baseline="0" cap="none" i="0" spc="0" strike="noStrike" sz="3800" u="none">
+        <a:defRPr sz="3800" b="0" i="0" u="none" strike="noStrike" cap="none" spc="0" baseline="0">
           <a:ln>
             <a:noFill/>
           </a:ln>
@@ -2619,7 +2708,7 @@
         <a:buFontTx/>
         <a:buChar char="•"/>
         <a:tabLst/>
-        <a:defRPr b="0" baseline="0" cap="none" i="0" spc="0" strike="noStrike" sz="3800" u="none">
+        <a:defRPr sz="3800" b="0" i="0" u="none" strike="noStrike" cap="none" spc="0" baseline="0">
           <a:ln>
             <a:noFill/>
           </a:ln>
@@ -2648,7 +2737,7 @@
         <a:buFontTx/>
         <a:buChar char="•"/>
         <a:tabLst/>
-        <a:defRPr b="0" baseline="0" cap="none" i="0" spc="0" strike="noStrike" sz="3800" u="none">
+        <a:defRPr sz="3800" b="0" i="0" u="none" strike="noStrike" cap="none" spc="0" baseline="0">
           <a:ln>
             <a:noFill/>
           </a:ln>
@@ -2677,7 +2766,7 @@
         <a:buFontTx/>
         <a:buChar char="•"/>
         <a:tabLst/>
-        <a:defRPr b="0" baseline="0" cap="none" i="0" spc="0" strike="noStrike" sz="3800" u="none">
+        <a:defRPr sz="3800" b="0" i="0" u="none" strike="noStrike" cap="none" spc="0" baseline="0">
           <a:ln>
             <a:noFill/>
           </a:ln>
@@ -2706,7 +2795,7 @@
         <a:buFontTx/>
         <a:buChar char="•"/>
         <a:tabLst/>
-        <a:defRPr b="0" baseline="0" cap="none" i="0" spc="0" strike="noStrike" sz="3800" u="none">
+        <a:defRPr sz="3800" b="0" i="0" u="none" strike="noStrike" cap="none" spc="0" baseline="0">
           <a:ln>
             <a:noFill/>
           </a:ln>
@@ -2735,7 +2824,7 @@
         <a:buFontTx/>
         <a:buChar char="•"/>
         <a:tabLst/>
-        <a:defRPr b="0" baseline="0" cap="none" i="0" spc="0" strike="noStrike" sz="3800" u="none">
+        <a:defRPr sz="3800" b="0" i="0" u="none" strike="noStrike" cap="none" spc="0" baseline="0">
           <a:ln>
             <a:noFill/>
           </a:ln>
@@ -2766,7 +2855,7 @@
         <a:buFontTx/>
         <a:buNone/>
         <a:tabLst/>
-        <a:defRPr b="0" baseline="0" cap="none" i="0" spc="0" strike="noStrike" sz="1800" u="none">
+        <a:defRPr sz="1800" b="0" i="0" u="none" strike="noStrike" cap="none" spc="0" baseline="0">
           <a:ln>
             <a:noFill/>
           </a:ln>
@@ -2795,7 +2884,7 @@
         <a:buFontTx/>
         <a:buNone/>
         <a:tabLst/>
-        <a:defRPr b="0" baseline="0" cap="none" i="0" spc="0" strike="noStrike" sz="1800" u="none">
+        <a:defRPr sz="1800" b="0" i="0" u="none" strike="noStrike" cap="none" spc="0" baseline="0">
           <a:ln>
             <a:noFill/>
           </a:ln>
@@ -2824,7 +2913,7 @@
         <a:buFontTx/>
         <a:buNone/>
         <a:tabLst/>
-        <a:defRPr b="0" baseline="0" cap="none" i="0" spc="0" strike="noStrike" sz="1800" u="none">
+        <a:defRPr sz="1800" b="0" i="0" u="none" strike="noStrike" cap="none" spc="0" baseline="0">
           <a:ln>
             <a:noFill/>
           </a:ln>
@@ -2853,7 +2942,7 @@
         <a:buFontTx/>
         <a:buNone/>
         <a:tabLst/>
-        <a:defRPr b="0" baseline="0" cap="none" i="0" spc="0" strike="noStrike" sz="1800" u="none">
+        <a:defRPr sz="1800" b="0" i="0" u="none" strike="noStrike" cap="none" spc="0" baseline="0">
           <a:ln>
             <a:noFill/>
           </a:ln>
@@ -2882,7 +2971,7 @@
         <a:buFontTx/>
         <a:buNone/>
         <a:tabLst/>
-        <a:defRPr b="0" baseline="0" cap="none" i="0" spc="0" strike="noStrike" sz="1800" u="none">
+        <a:defRPr sz="1800" b="0" i="0" u="none" strike="noStrike" cap="none" spc="0" baseline="0">
           <a:ln>
             <a:noFill/>
           </a:ln>
@@ -2911,7 +3000,7 @@
         <a:buFontTx/>
         <a:buNone/>
         <a:tabLst/>
-        <a:defRPr b="0" baseline="0" cap="none" i="0" spc="0" strike="noStrike" sz="1800" u="none">
+        <a:defRPr sz="1800" b="0" i="0" u="none" strike="noStrike" cap="none" spc="0" baseline="0">
           <a:ln>
             <a:noFill/>
           </a:ln>
@@ -2940,7 +3029,7 @@
         <a:buFontTx/>
         <a:buNone/>
         <a:tabLst/>
-        <a:defRPr b="0" baseline="0" cap="none" i="0" spc="0" strike="noStrike" sz="1800" u="none">
+        <a:defRPr sz="1800" b="0" i="0" u="none" strike="noStrike" cap="none" spc="0" baseline="0">
           <a:ln>
             <a:noFill/>
           </a:ln>
@@ -2969,7 +3058,7 @@
         <a:buFontTx/>
         <a:buNone/>
         <a:tabLst/>
-        <a:defRPr b="0" baseline="0" cap="none" i="0" spc="0" strike="noStrike" sz="1800" u="none">
+        <a:defRPr sz="1800" b="0" i="0" u="none" strike="noStrike" cap="none" spc="0" baseline="0">
           <a:ln>
             <a:noFill/>
           </a:ln>
@@ -2998,7 +3087,7 @@
         <a:buFontTx/>
         <a:buNone/>
         <a:tabLst/>
-        <a:defRPr b="0" baseline="0" cap="none" i="0" spc="0" strike="noStrike" sz="1800" u="none">
+        <a:defRPr sz="1800" b="0" i="0" u="none" strike="noStrike" cap="none" spc="0" baseline="0">
           <a:ln>
             <a:noFill/>
           </a:ln>
@@ -3018,7 +3107,7 @@
 </file>
 
 <file path=ppt/slides/slide1.xml><?xml version="1.0" encoding="utf-8"?>
-<p:sld xmlns:a="http://schemas.openxmlformats.org/drawingml/2006/main" xmlns:r="http://schemas.openxmlformats.org/officeDocument/2006/relationships" xmlns:p="http://schemas.openxmlformats.org/presentationml/2006/main" showMasterSp="1" showMasterPhAnim="1">
+<p:sld xmlns:a="http://schemas.openxmlformats.org/drawingml/2006/main" xmlns:r="http://schemas.openxmlformats.org/officeDocument/2006/relationships" xmlns:p="http://schemas.openxmlformats.org/presentationml/2006/main">
   <p:cSld>
     <p:spTree>
       <p:nvGrpSpPr>
@@ -3038,7 +3127,7 @@
         <p:nvPicPr>
           <p:cNvPr id="119" name="2-002_m_1869x1399.png"/>
           <p:cNvPicPr>
-            <a:picLocks noChangeAspect="1"/>
+            <a:picLocks noGrp="1" noChangeAspect="1"/>
           </p:cNvPicPr>
           <p:nvPr>
             <p:ph type="pic" idx="13"/>
@@ -3048,7 +3137,7 @@
           <a:blip r:embed="rId2">
             <a:extLst/>
           </a:blip>
-          <a:srcRect l="841" t="15349" r="0" b="9299"/>
+          <a:srcRect l="841" t="15349" b="9299"/>
           <a:stretch>
             <a:fillRect/>
           </a:stretch>
@@ -3066,7 +3155,9 @@
       <p:sp>
         <p:nvSpPr>
           <p:cNvPr id="120" name="Shape 120"/>
-          <p:cNvSpPr/>
+          <p:cNvSpPr>
+            <a:spLocks noGrp="1"/>
+          </p:cNvSpPr>
           <p:nvPr>
             <p:ph type="title"/>
           </p:nvPr>
@@ -3080,7 +3171,6 @@
           <a:bodyPr/>
           <a:lstStyle/>
           <a:p>
-            <a:pPr/>
             <a:r>
               <a:t>Python </a:t>
             </a:r>
@@ -3090,7 +3180,9 @@
       <p:sp>
         <p:nvSpPr>
           <p:cNvPr id="121" name="Shape 121"/>
-          <p:cNvSpPr/>
+          <p:cNvSpPr>
+            <a:spLocks noGrp="1"/>
+          </p:cNvSpPr>
           <p:nvPr>
             <p:ph type="body" sz="quarter" idx="1"/>
           </p:nvPr>
@@ -3104,7 +3196,6 @@
           <a:bodyPr/>
           <a:lstStyle/>
           <a:p>
-            <a:pPr/>
             <a:r>
               <a:t>September 17th, 2016 Info Session</a:t>
             </a:r>
@@ -3116,12 +3207,12 @@
   <p:clrMapOvr>
     <a:masterClrMapping/>
   </p:clrMapOvr>
-  <p:transition xmlns:p14="http://schemas.microsoft.com/office/powerpoint/2010/main" spd="med" advClick="1"/>
+  <p:transition spd="med"/>
 </p:sld>
 </file>
 
 <file path=ppt/slides/slide10.xml><?xml version="1.0" encoding="utf-8"?>
-<p:sld xmlns:a="http://schemas.openxmlformats.org/drawingml/2006/main" xmlns:r="http://schemas.openxmlformats.org/officeDocument/2006/relationships" xmlns:p="http://schemas.openxmlformats.org/presentationml/2006/main" showMasterSp="1" showMasterPhAnim="1">
+<p:sld xmlns:a="http://schemas.openxmlformats.org/drawingml/2006/main" xmlns:r="http://schemas.openxmlformats.org/officeDocument/2006/relationships" xmlns:p="http://schemas.openxmlformats.org/presentationml/2006/main">
   <p:cSld>
     <p:spTree>
       <p:nvGrpSpPr>
@@ -3140,7 +3231,9 @@
       <p:sp>
         <p:nvSpPr>
           <p:cNvPr id="147" name="Shape 147"/>
-          <p:cNvSpPr/>
+          <p:cNvSpPr>
+            <a:spLocks noGrp="1"/>
+          </p:cNvSpPr>
           <p:nvPr>
             <p:ph type="title"/>
           </p:nvPr>
@@ -3154,7 +3247,6 @@
           <a:bodyPr/>
           <a:lstStyle/>
           <a:p>
-            <a:pPr/>
             <a:r>
               <a:t>More on Python</a:t>
             </a:r>
@@ -3164,7 +3256,9 @@
       <p:sp>
         <p:nvSpPr>
           <p:cNvPr id="148" name="Shape 148"/>
-          <p:cNvSpPr/>
+          <p:cNvSpPr>
+            <a:spLocks noGrp="1"/>
+          </p:cNvSpPr>
           <p:nvPr>
             <p:ph type="body" idx="1"/>
           </p:nvPr>
@@ -3189,7 +3283,7 @@
             </a:r>
           </a:p>
           <a:p>
-            <a:pPr lvl="1" marL="541527" indent="-270763" defTabSz="303783">
+            <a:pPr marL="541527" lvl="1" indent="-270763" defTabSz="303783">
               <a:spcBef>
                 <a:spcPts val="2300"/>
               </a:spcBef>
@@ -3200,7 +3294,7 @@
             </a:r>
           </a:p>
           <a:p>
-            <a:pPr lvl="2" marL="812291" indent="-270763" defTabSz="303783">
+            <a:pPr marL="812291" lvl="2" indent="-270763" defTabSz="303783">
               <a:spcBef>
                 <a:spcPts val="2300"/>
               </a:spcBef>
@@ -3211,7 +3305,7 @@
             </a:r>
           </a:p>
           <a:p>
-            <a:pPr lvl="2" marL="812291" indent="-270763" defTabSz="303783">
+            <a:pPr marL="812291" lvl="2" indent="-270763" defTabSz="303783">
               <a:spcBef>
                 <a:spcPts val="2300"/>
               </a:spcBef>
@@ -3222,7 +3316,7 @@
             </a:r>
           </a:p>
           <a:p>
-            <a:pPr lvl="2" marL="812291" indent="-270763" defTabSz="303783">
+            <a:pPr marL="812291" lvl="2" indent="-270763" defTabSz="303783">
               <a:spcBef>
                 <a:spcPts val="2300"/>
               </a:spcBef>
@@ -3233,7 +3327,7 @@
             </a:r>
           </a:p>
           <a:p>
-            <a:pPr lvl="1" marL="541527" indent="-270763" defTabSz="303783">
+            <a:pPr marL="541527" lvl="1" indent="-270763" defTabSz="303783">
               <a:spcBef>
                 <a:spcPts val="2300"/>
               </a:spcBef>
@@ -3244,7 +3338,7 @@
             </a:r>
           </a:p>
           <a:p>
-            <a:pPr lvl="2" marL="812291" indent="-270763" defTabSz="303783">
+            <a:pPr marL="812291" lvl="2" indent="-270763" defTabSz="303783">
               <a:spcBef>
                 <a:spcPts val="2300"/>
               </a:spcBef>
@@ -3255,7 +3349,7 @@
             </a:r>
           </a:p>
           <a:p>
-            <a:pPr lvl="2" marL="812291" indent="-270763" defTabSz="303783">
+            <a:pPr marL="812291" lvl="2" indent="-270763" defTabSz="303783">
               <a:spcBef>
                 <a:spcPts val="2300"/>
               </a:spcBef>
@@ -3266,7 +3360,7 @@
             </a:r>
           </a:p>
           <a:p>
-            <a:pPr lvl="2" marL="812291" indent="-270763" defTabSz="303783">
+            <a:pPr marL="812291" lvl="2" indent="-270763" defTabSz="303783">
               <a:spcBef>
                 <a:spcPts val="2300"/>
               </a:spcBef>
@@ -3283,12 +3377,12 @@
   <p:clrMapOvr>
     <a:masterClrMapping/>
   </p:clrMapOvr>
-  <p:transition xmlns:p14="http://schemas.microsoft.com/office/powerpoint/2010/main" spd="med" advClick="1" p14:dur="1000"/>
+  <p:transition spd="slow"/>
 </p:sld>
 </file>
 
 <file path=ppt/slides/slide11.xml><?xml version="1.0" encoding="utf-8"?>
-<p:sld xmlns:a="http://schemas.openxmlformats.org/drawingml/2006/main" xmlns:r="http://schemas.openxmlformats.org/officeDocument/2006/relationships" xmlns:p="http://schemas.openxmlformats.org/presentationml/2006/main" showMasterSp="1" showMasterPhAnim="1">
+<p:sld xmlns:a="http://schemas.openxmlformats.org/drawingml/2006/main" xmlns:r="http://schemas.openxmlformats.org/officeDocument/2006/relationships" xmlns:p="http://schemas.openxmlformats.org/presentationml/2006/main">
   <p:cSld>
     <p:spTree>
       <p:nvGrpSpPr>
@@ -3307,7 +3401,9 @@
       <p:sp>
         <p:nvSpPr>
           <p:cNvPr id="150" name="Shape 150"/>
-          <p:cNvSpPr/>
+          <p:cNvSpPr>
+            <a:spLocks noGrp="1"/>
+          </p:cNvSpPr>
           <p:nvPr>
             <p:ph type="title"/>
           </p:nvPr>
@@ -3321,7 +3417,6 @@
           <a:bodyPr/>
           <a:lstStyle/>
           <a:p>
-            <a:pPr/>
             <a:r>
               <a:t>More on Python</a:t>
             </a:r>
@@ -3331,7 +3426,9 @@
       <p:sp>
         <p:nvSpPr>
           <p:cNvPr id="151" name="Shape 151"/>
-          <p:cNvSpPr/>
+          <p:cNvSpPr>
+            <a:spLocks noGrp="1"/>
+          </p:cNvSpPr>
           <p:nvPr>
             <p:ph type="body" idx="1"/>
           </p:nvPr>
@@ -3352,76 +3449,83 @@
               <a:defRPr sz="1840"/>
             </a:pPr>
             <a:r>
+              <a:rPr dirty="0"/>
               <a:t>Some quick cons:</a:t>
             </a:r>
           </a:p>
           <a:p>
-            <a:pPr lvl="1" marL="416559" indent="-208279" defTabSz="233679">
+            <a:pPr marL="416559" lvl="1" indent="-208279" defTabSz="233679">
               <a:spcBef>
                 <a:spcPts val="1800"/>
               </a:spcBef>
               <a:defRPr sz="1840"/>
             </a:pPr>
             <a:r>
+              <a:rPr dirty="0"/>
               <a:t>Python can cause a lot of headaches in a complicated project</a:t>
             </a:r>
           </a:p>
           <a:p>
-            <a:pPr lvl="1" marL="416559" indent="-208279" defTabSz="233679">
+            <a:pPr marL="416559" lvl="1" indent="-208279" defTabSz="233679">
               <a:spcBef>
                 <a:spcPts val="1800"/>
               </a:spcBef>
               <a:defRPr sz="1840"/>
             </a:pPr>
             <a:r>
+              <a:rPr dirty="0"/>
               <a:t>Why? For the same reasons that it is great for prototyping:</a:t>
             </a:r>
           </a:p>
           <a:p>
-            <a:pPr lvl="2" marL="624840" indent="-208279" defTabSz="233679">
+            <a:pPr marL="624840" lvl="2" indent="-208279" defTabSz="233679">
               <a:spcBef>
                 <a:spcPts val="1800"/>
               </a:spcBef>
               <a:defRPr sz="1840"/>
             </a:pPr>
             <a:r>
+              <a:rPr dirty="0"/>
               <a:t>Code is easy to read &amp; therefore easy to share with others</a:t>
             </a:r>
           </a:p>
           <a:p>
-            <a:pPr lvl="3" marL="833119" indent="-208279" defTabSz="233679">
+            <a:pPr marL="833119" lvl="3" indent="-208279" defTabSz="233679">
               <a:spcBef>
                 <a:spcPts val="1800"/>
               </a:spcBef>
               <a:defRPr sz="1840"/>
             </a:pPr>
             <a:r>
+              <a:rPr dirty="0"/>
               <a:t>It’s easy to put a function call or other statement at the wrong indentation level</a:t>
             </a:r>
           </a:p>
           <a:p>
-            <a:pPr lvl="2" marL="624840" indent="-208279" defTabSz="233679">
+            <a:pPr marL="624840" lvl="2" indent="-208279" defTabSz="233679">
               <a:spcBef>
                 <a:spcPts val="1800"/>
               </a:spcBef>
               <a:defRPr sz="1840"/>
             </a:pPr>
             <a:r>
+              <a:rPr dirty="0"/>
               <a:t>No required declarations for memory and typing means less to write &amp; think about</a:t>
             </a:r>
           </a:p>
           <a:p>
-            <a:pPr lvl="3" marL="833119" indent="-208279" defTabSz="233679">
+            <a:pPr marL="833119" lvl="3" indent="-208279" defTabSz="233679">
               <a:spcBef>
                 <a:spcPts val="1800"/>
               </a:spcBef>
               <a:defRPr sz="1840"/>
             </a:pPr>
             <a:r>
+              <a:rPr dirty="0"/>
               <a:t>In general, Python is memory-expensive - it’s data structures have </a:t>
             </a:r>
             <a:r>
-              <a:rPr>
+              <a:rPr dirty="0">
                 <a:latin typeface="Gill Sans SemiBold"/>
                 <a:ea typeface="Gill Sans SemiBold"/>
                 <a:cs typeface="Gill Sans SemiBold"/>
@@ -3430,10 +3534,11 @@
               <a:t>a lot </a:t>
             </a:r>
             <a:r>
+              <a:rPr dirty="0"/>
               <a:t>of nice features, each of which takes up </a:t>
             </a:r>
             <a:r>
-              <a:rPr>
+              <a:rPr dirty="0">
                 <a:latin typeface="Gill Sans SemiBold"/>
                 <a:ea typeface="Gill Sans SemiBold"/>
                 <a:cs typeface="Gill Sans SemiBold"/>
@@ -3441,25 +3546,20 @@
               </a:rPr>
               <a:t>space</a:t>
             </a:r>
-            <a:endParaRPr>
-              <a:latin typeface="Gill Sans SemiBold"/>
-              <a:ea typeface="Gill Sans SemiBold"/>
-              <a:cs typeface="Gill Sans SemiBold"/>
-              <a:sym typeface="Gill Sans SemiBold"/>
-            </a:endParaRPr>
-          </a:p>
-          <a:p>
-            <a:pPr lvl="3" marL="833119" indent="-208279" defTabSz="233679">
+          </a:p>
+          <a:p>
+            <a:pPr marL="833119" lvl="3" indent="-208279" defTabSz="233679">
               <a:spcBef>
                 <a:spcPts val="1800"/>
               </a:spcBef>
               <a:defRPr sz="1840"/>
             </a:pPr>
             <a:r>
+              <a:rPr dirty="0"/>
               <a:t>It is </a:t>
             </a:r>
             <a:r>
-              <a:rPr>
+              <a:rPr dirty="0">
                 <a:latin typeface="Gill Sans SemiBold"/>
                 <a:ea typeface="Gill Sans SemiBold"/>
                 <a:cs typeface="Gill Sans SemiBold"/>
@@ -3468,21 +3568,23 @@
               <a:t>not</a:t>
             </a:r>
             <a:r>
+              <a:rPr dirty="0"/>
               <a:t> optimized for tail-recursion, which if you like to program in a functional style, is annoying</a:t>
             </a:r>
           </a:p>
           <a:p>
-            <a:pPr lvl="3" marL="833119" indent="-208279" defTabSz="233679">
+            <a:pPr marL="833119" lvl="3" indent="-208279" defTabSz="233679">
               <a:spcBef>
                 <a:spcPts val="1800"/>
               </a:spcBef>
               <a:defRPr sz="1840"/>
             </a:pPr>
             <a:r>
+              <a:rPr dirty="0"/>
               <a:t>Lack of typing can lead to </a:t>
             </a:r>
             <a:r>
-              <a:rPr>
+              <a:rPr dirty="0">
                 <a:latin typeface="Gill Sans SemiBold"/>
                 <a:ea typeface="Gill Sans SemiBold"/>
                 <a:cs typeface="Gill Sans SemiBold"/>
@@ -3491,9 +3593,10 @@
               <a:t>all sorts </a:t>
             </a:r>
             <a:r>
+              <a:rPr dirty="0"/>
               <a:t>of problems, especially when I/O is involved</a:t>
             </a:r>
-            <a:endParaRPr>
+            <a:endParaRPr dirty="0">
               <a:latin typeface="Gill Sans SemiBold"/>
               <a:ea typeface="Gill Sans SemiBold"/>
               <a:cs typeface="Gill Sans SemiBold"/>
@@ -3501,25 +3604,47 @@
             </a:endParaRPr>
           </a:p>
           <a:p>
-            <a:pPr lvl="2" marL="624840" indent="-208279" defTabSz="233679">
+            <a:pPr marL="624840" lvl="2" indent="-208279" defTabSz="233679">
               <a:spcBef>
                 <a:spcPts val="1800"/>
               </a:spcBef>
               <a:defRPr sz="1840"/>
             </a:pPr>
             <a:r>
+              <a:rPr dirty="0"/>
               <a:t>No waiting for compiles means you get immediate feedback even on a large code base</a:t>
             </a:r>
           </a:p>
           <a:p>
-            <a:pPr lvl="3" marL="833119" indent="-208279" defTabSz="233679">
+            <a:pPr marL="833119" lvl="3" indent="-208279" defTabSz="233679">
               <a:spcBef>
                 <a:spcPts val="1800"/>
               </a:spcBef>
               <a:defRPr sz="1840"/>
             </a:pPr>
             <a:r>
-              <a:t>A real compile can catch many errors, + compilation makes code run faster</a:t>
+              <a:rPr dirty="0"/>
+              <a:t>A </a:t>
+            </a:r>
+            <a:r>
+              <a:rPr/>
+              <a:t>real </a:t>
+            </a:r>
+            <a:r>
+              <a:rPr smtClean="0"/>
+              <a:t>compile</a:t>
+            </a:r>
+            <a:r>
+              <a:rPr lang="en-US" smtClean="0"/>
+              <a:t>r</a:t>
+            </a:r>
+            <a:r>
+              <a:rPr smtClean="0"/>
+              <a:t> </a:t>
+            </a:r>
+            <a:r>
+              <a:rPr dirty="0"/>
+              <a:t>can catch many errors, + compilation makes code run faster</a:t>
             </a:r>
           </a:p>
         </p:txBody>
@@ -3529,12 +3654,12 @@
   <p:clrMapOvr>
     <a:masterClrMapping/>
   </p:clrMapOvr>
-  <p:transition xmlns:p14="http://schemas.microsoft.com/office/powerpoint/2010/main" spd="med" advClick="1" p14:dur="1000"/>
+  <p:transition spd="slow"/>
 </p:sld>
 </file>
 
 <file path=ppt/slides/slide12.xml><?xml version="1.0" encoding="utf-8"?>
-<p:sld xmlns:a="http://schemas.openxmlformats.org/drawingml/2006/main" xmlns:r="http://schemas.openxmlformats.org/officeDocument/2006/relationships" xmlns:p="http://schemas.openxmlformats.org/presentationml/2006/main" showMasterSp="1" showMasterPhAnim="1">
+<p:sld xmlns:a="http://schemas.openxmlformats.org/drawingml/2006/main" xmlns:r="http://schemas.openxmlformats.org/officeDocument/2006/relationships" xmlns:p="http://schemas.openxmlformats.org/presentationml/2006/main">
   <p:cSld>
     <p:spTree>
       <p:nvGrpSpPr>
@@ -3553,7 +3678,9 @@
       <p:sp>
         <p:nvSpPr>
           <p:cNvPr id="153" name="Shape 153"/>
-          <p:cNvSpPr/>
+          <p:cNvSpPr>
+            <a:spLocks noGrp="1"/>
+          </p:cNvSpPr>
           <p:nvPr>
             <p:ph type="title"/>
           </p:nvPr>
@@ -3567,7 +3694,6 @@
           <a:bodyPr/>
           <a:lstStyle/>
           <a:p>
-            <a:pPr/>
             <a:r>
               <a:t>More on Python</a:t>
             </a:r>
@@ -3577,7 +3703,9 @@
       <p:sp>
         <p:nvSpPr>
           <p:cNvPr id="154" name="Shape 154"/>
-          <p:cNvSpPr/>
+          <p:cNvSpPr>
+            <a:spLocks noGrp="1"/>
+          </p:cNvSpPr>
           <p:nvPr>
             <p:ph type="body" idx="1"/>
           </p:nvPr>
@@ -3591,7 +3719,6 @@
           <a:bodyPr/>
           <a:lstStyle/>
           <a:p>
-            <a:pPr/>
             <a:r>
               <a:t>Overall:</a:t>
             </a:r>
@@ -3609,12 +3736,12 @@
   <p:clrMapOvr>
     <a:masterClrMapping/>
   </p:clrMapOvr>
-  <p:transition xmlns:p14="http://schemas.microsoft.com/office/powerpoint/2010/main" spd="med" advClick="1" p14:dur="1000"/>
+  <p:transition spd="slow"/>
 </p:sld>
 </file>
 
 <file path=ppt/slides/slide13.xml><?xml version="1.0" encoding="utf-8"?>
-<p:sld xmlns:a="http://schemas.openxmlformats.org/drawingml/2006/main" xmlns:r="http://schemas.openxmlformats.org/officeDocument/2006/relationships" xmlns:p="http://schemas.openxmlformats.org/presentationml/2006/main" showMasterSp="1" showMasterPhAnim="1">
+<p:sld xmlns:a="http://schemas.openxmlformats.org/drawingml/2006/main" xmlns:r="http://schemas.openxmlformats.org/officeDocument/2006/relationships" xmlns:p="http://schemas.openxmlformats.org/presentationml/2006/main">
   <p:cSld>
     <p:spTree>
       <p:nvGrpSpPr>
@@ -3633,7 +3760,9 @@
       <p:sp>
         <p:nvSpPr>
           <p:cNvPr id="156" name="Shape 156"/>
-          <p:cNvSpPr/>
+          <p:cNvSpPr>
+            <a:spLocks noGrp="1"/>
+          </p:cNvSpPr>
           <p:nvPr>
             <p:ph type="title"/>
           </p:nvPr>
@@ -3647,7 +3776,6 @@
           <a:bodyPr/>
           <a:lstStyle/>
           <a:p>
-            <a:pPr/>
             <a:r>
               <a:t>rough outline</a:t>
             </a:r>
@@ -3657,7 +3785,9 @@
       <p:sp>
         <p:nvSpPr>
           <p:cNvPr id="157" name="Shape 157"/>
-          <p:cNvSpPr/>
+          <p:cNvSpPr>
+            <a:spLocks noGrp="1"/>
+          </p:cNvSpPr>
           <p:nvPr>
             <p:ph type="body" idx="1"/>
           </p:nvPr>
@@ -3668,7 +3798,9 @@
           </a:prstGeom>
         </p:spPr>
         <p:txBody>
-          <a:bodyPr/>
+          <a:bodyPr>
+            <a:normAutofit lnSpcReduction="10000"/>
+          </a:bodyPr>
           <a:lstStyle/>
           <a:p>
             <a:pPr marL="328040" indent="-328040" defTabSz="368045">
@@ -3700,7 +3832,7 @@
             </a:r>
           </a:p>
           <a:p>
-            <a:pPr lvl="1" marL="656081" indent="-328040" defTabSz="368045">
+            <a:pPr marL="656081" lvl="1" indent="-328040" defTabSz="368045">
               <a:spcBef>
                 <a:spcPts val="2800"/>
               </a:spcBef>
@@ -3711,7 +3843,7 @@
             </a:r>
           </a:p>
           <a:p>
-            <a:pPr lvl="1" marL="656081" indent="-328040" defTabSz="368045">
+            <a:pPr marL="656081" lvl="1" indent="-328040" defTabSz="368045">
               <a:spcBef>
                 <a:spcPts val="2800"/>
               </a:spcBef>
@@ -3722,7 +3854,7 @@
             </a:r>
           </a:p>
           <a:p>
-            <a:pPr lvl="1" marL="656081" indent="-328040" defTabSz="368045">
+            <a:pPr marL="656081" lvl="1" indent="-328040" defTabSz="368045">
               <a:spcBef>
                 <a:spcPts val="2800"/>
               </a:spcBef>
@@ -3773,12 +3905,12 @@
   <p:clrMapOvr>
     <a:masterClrMapping/>
   </p:clrMapOvr>
-  <p:transition xmlns:p14="http://schemas.microsoft.com/office/powerpoint/2010/main" spd="med" advClick="1" p14:dur="1000"/>
+  <p:transition spd="slow"/>
 </p:sld>
 </file>
 
 <file path=ppt/slides/slide14.xml><?xml version="1.0" encoding="utf-8"?>
-<p:sld xmlns:a="http://schemas.openxmlformats.org/drawingml/2006/main" xmlns:r="http://schemas.openxmlformats.org/officeDocument/2006/relationships" xmlns:p="http://schemas.openxmlformats.org/presentationml/2006/main" showMasterSp="1" showMasterPhAnim="1">
+<p:sld xmlns:a="http://schemas.openxmlformats.org/drawingml/2006/main" xmlns:r="http://schemas.openxmlformats.org/officeDocument/2006/relationships" xmlns:p="http://schemas.openxmlformats.org/presentationml/2006/main">
   <p:cSld>
     <p:spTree>
       <p:nvGrpSpPr>
@@ -3797,7 +3929,9 @@
       <p:sp>
         <p:nvSpPr>
           <p:cNvPr id="159" name="Shape 159"/>
-          <p:cNvSpPr/>
+          <p:cNvSpPr>
+            <a:spLocks noGrp="1"/>
+          </p:cNvSpPr>
           <p:nvPr>
             <p:ph type="title"/>
           </p:nvPr>
@@ -3811,7 +3945,6 @@
           <a:bodyPr/>
           <a:lstStyle/>
           <a:p>
-            <a:pPr/>
             <a:r>
               <a:t>session 1</a:t>
             </a:r>
@@ -3821,7 +3954,9 @@
       <p:sp>
         <p:nvSpPr>
           <p:cNvPr id="160" name="Shape 160"/>
-          <p:cNvSpPr/>
+          <p:cNvSpPr>
+            <a:spLocks noGrp="1"/>
+          </p:cNvSpPr>
           <p:nvPr>
             <p:ph type="body" idx="1"/>
           </p:nvPr>
@@ -3835,7 +3970,7 @@
           <a:bodyPr/>
           <a:lstStyle/>
           <a:p>
-            <a:pPr lvl="1" marL="0" indent="96011" defTabSz="245363">
+            <a:pPr marL="0" lvl="1" indent="96011" defTabSz="245363">
               <a:spcBef>
                 <a:spcPts val="1900"/>
               </a:spcBef>
@@ -3853,7 +3988,7 @@
             </a:r>
           </a:p>
           <a:p>
-            <a:pPr lvl="1" marL="437387" indent="-218693" defTabSz="245363">
+            <a:pPr marL="437387" lvl="1" indent="-218693" defTabSz="245363">
               <a:spcBef>
                 <a:spcPts val="1900"/>
               </a:spcBef>
@@ -3864,7 +3999,7 @@
             </a:r>
           </a:p>
           <a:p>
-            <a:pPr lvl="2" marL="656081" indent="-218693" defTabSz="245363">
+            <a:pPr marL="656081" lvl="2" indent="-218693" defTabSz="245363">
               <a:spcBef>
                 <a:spcPts val="1900"/>
               </a:spcBef>
@@ -3875,7 +4010,7 @@
             </a:r>
           </a:p>
           <a:p>
-            <a:pPr lvl="1" marL="437387" indent="-218693" defTabSz="245363">
+            <a:pPr marL="437387" lvl="1" indent="-218693" defTabSz="245363">
               <a:spcBef>
                 <a:spcPts val="1900"/>
               </a:spcBef>
@@ -3886,7 +4021,7 @@
             </a:r>
           </a:p>
           <a:p>
-            <a:pPr lvl="2" marL="656081" indent="-218693" defTabSz="245363">
+            <a:pPr marL="656081" lvl="2" indent="-218693" defTabSz="245363">
               <a:spcBef>
                 <a:spcPts val="1900"/>
               </a:spcBef>
@@ -3897,7 +4032,7 @@
             </a:r>
           </a:p>
           <a:p>
-            <a:pPr lvl="2" marL="656081" indent="-218693" defTabSz="245363">
+            <a:pPr marL="656081" lvl="2" indent="-218693" defTabSz="245363">
               <a:spcBef>
                 <a:spcPts val="1900"/>
               </a:spcBef>
@@ -3908,7 +4043,7 @@
             </a:r>
           </a:p>
           <a:p>
-            <a:pPr lvl="2" marL="656081" indent="-218693" defTabSz="245363">
+            <a:pPr marL="656081" lvl="2" indent="-218693" defTabSz="245363">
               <a:spcBef>
                 <a:spcPts val="1900"/>
               </a:spcBef>
@@ -3919,7 +4054,7 @@
             </a:r>
           </a:p>
           <a:p>
-            <a:pPr lvl="2" marL="656081" indent="-218693" defTabSz="245363">
+            <a:pPr marL="656081" lvl="2" indent="-218693" defTabSz="245363">
               <a:spcBef>
                 <a:spcPts val="1900"/>
               </a:spcBef>
@@ -3930,7 +4065,7 @@
             </a:r>
           </a:p>
           <a:p>
-            <a:pPr lvl="2" marL="656081" indent="-218693" defTabSz="245363">
+            <a:pPr marL="656081" lvl="2" indent="-218693" defTabSz="245363">
               <a:spcBef>
                 <a:spcPts val="1900"/>
               </a:spcBef>
@@ -3941,7 +4076,7 @@
             </a:r>
           </a:p>
           <a:p>
-            <a:pPr lvl="2" marL="656081" indent="-218693" defTabSz="245363">
+            <a:pPr marL="656081" lvl="2" indent="-218693" defTabSz="245363">
               <a:spcBef>
                 <a:spcPts val="1900"/>
               </a:spcBef>
@@ -3952,7 +4087,7 @@
             </a:r>
           </a:p>
           <a:p>
-            <a:pPr lvl="1" marL="437387" indent="-218693" defTabSz="245363">
+            <a:pPr marL="437387" lvl="1" indent="-218693" defTabSz="245363">
               <a:spcBef>
                 <a:spcPts val="1900"/>
               </a:spcBef>
@@ -3969,12 +4104,12 @@
   <p:clrMapOvr>
     <a:masterClrMapping/>
   </p:clrMapOvr>
-  <p:transition xmlns:p14="http://schemas.microsoft.com/office/powerpoint/2010/main" spd="med" advClick="1" p14:dur="1000"/>
+  <p:transition spd="slow"/>
 </p:sld>
 </file>
 
 <file path=ppt/slides/slide15.xml><?xml version="1.0" encoding="utf-8"?>
-<p:sld xmlns:a="http://schemas.openxmlformats.org/drawingml/2006/main" xmlns:r="http://schemas.openxmlformats.org/officeDocument/2006/relationships" xmlns:p="http://schemas.openxmlformats.org/presentationml/2006/main" showMasterSp="1" showMasterPhAnim="1">
+<p:sld xmlns:a="http://schemas.openxmlformats.org/drawingml/2006/main" xmlns:r="http://schemas.openxmlformats.org/officeDocument/2006/relationships" xmlns:p="http://schemas.openxmlformats.org/presentationml/2006/main">
   <p:cSld>
     <p:spTree>
       <p:nvGrpSpPr>
@@ -3993,7 +4128,9 @@
       <p:sp>
         <p:nvSpPr>
           <p:cNvPr id="162" name="Shape 162"/>
-          <p:cNvSpPr/>
+          <p:cNvSpPr>
+            <a:spLocks noGrp="1"/>
+          </p:cNvSpPr>
           <p:nvPr>
             <p:ph type="title"/>
           </p:nvPr>
@@ -4007,7 +4144,6 @@
           <a:bodyPr/>
           <a:lstStyle/>
           <a:p>
-            <a:pPr/>
             <a:r>
               <a:t>session 2</a:t>
             </a:r>
@@ -4017,7 +4153,9 @@
       <p:sp>
         <p:nvSpPr>
           <p:cNvPr id="163" name="Shape 163"/>
-          <p:cNvSpPr/>
+          <p:cNvSpPr>
+            <a:spLocks noGrp="1"/>
+          </p:cNvSpPr>
           <p:nvPr>
             <p:ph type="body" idx="1"/>
           </p:nvPr>
@@ -4031,7 +4169,7 @@
           <a:bodyPr/>
           <a:lstStyle/>
           <a:p>
-            <a:pPr lvl="1" marL="0" indent="91440" defTabSz="233679">
+            <a:pPr marL="0" lvl="1" indent="91440" defTabSz="233679">
               <a:spcBef>
                 <a:spcPts val="1800"/>
               </a:spcBef>
@@ -4049,7 +4187,7 @@
             </a:r>
           </a:p>
           <a:p>
-            <a:pPr lvl="1" marL="416559" indent="-208279" defTabSz="233679">
+            <a:pPr marL="416559" lvl="1" indent="-208279" defTabSz="233679">
               <a:spcBef>
                 <a:spcPts val="1800"/>
               </a:spcBef>
@@ -4060,7 +4198,7 @@
             </a:r>
           </a:p>
           <a:p>
-            <a:pPr lvl="2" marL="624840" indent="-208279" defTabSz="233679">
+            <a:pPr marL="624840" lvl="2" indent="-208279" defTabSz="233679">
               <a:spcBef>
                 <a:spcPts val="1800"/>
               </a:spcBef>
@@ -4071,7 +4209,7 @@
             </a:r>
           </a:p>
           <a:p>
-            <a:pPr lvl="3" marL="833119" indent="-208279" defTabSz="233679">
+            <a:pPr marL="833119" lvl="3" indent="-208279" defTabSz="233679">
               <a:spcBef>
                 <a:spcPts val="1800"/>
               </a:spcBef>
@@ -4082,7 +4220,7 @@
             </a:r>
           </a:p>
           <a:p>
-            <a:pPr lvl="2" marL="624840" indent="-208279" defTabSz="233679">
+            <a:pPr marL="624840" lvl="2" indent="-208279" defTabSz="233679">
               <a:spcBef>
                 <a:spcPts val="1800"/>
               </a:spcBef>
@@ -4093,7 +4231,7 @@
             </a:r>
           </a:p>
           <a:p>
-            <a:pPr lvl="2" marL="624840" indent="-208279" defTabSz="233679">
+            <a:pPr marL="624840" lvl="2" indent="-208279" defTabSz="233679">
               <a:spcBef>
                 <a:spcPts val="1800"/>
               </a:spcBef>
@@ -4104,7 +4242,7 @@
             </a:r>
           </a:p>
           <a:p>
-            <a:pPr lvl="1" marL="416559" indent="-208279" defTabSz="233679">
+            <a:pPr marL="416559" lvl="1" indent="-208279" defTabSz="233679">
               <a:spcBef>
                 <a:spcPts val="1800"/>
               </a:spcBef>
@@ -4115,7 +4253,7 @@
             </a:r>
           </a:p>
           <a:p>
-            <a:pPr lvl="2" marL="624840" indent="-208279" defTabSz="233679">
+            <a:pPr marL="624840" lvl="2" indent="-208279" defTabSz="233679">
               <a:spcBef>
                 <a:spcPts val="1800"/>
               </a:spcBef>
@@ -4126,7 +4264,7 @@
             </a:r>
           </a:p>
           <a:p>
-            <a:pPr lvl="2" marL="624840" indent="-208279" defTabSz="233679">
+            <a:pPr marL="624840" lvl="2" indent="-208279" defTabSz="233679">
               <a:spcBef>
                 <a:spcPts val="1800"/>
               </a:spcBef>
@@ -4137,7 +4275,7 @@
             </a:r>
           </a:p>
           <a:p>
-            <a:pPr lvl="2" marL="624840" indent="-208279" defTabSz="233679">
+            <a:pPr marL="624840" lvl="2" indent="-208279" defTabSz="233679">
               <a:spcBef>
                 <a:spcPts val="1800"/>
               </a:spcBef>
@@ -4148,7 +4286,7 @@
             </a:r>
           </a:p>
           <a:p>
-            <a:pPr lvl="2" marL="624840" indent="-208279" defTabSz="233679">
+            <a:pPr marL="624840" lvl="2" indent="-208279" defTabSz="233679">
               <a:spcBef>
                 <a:spcPts val="1800"/>
               </a:spcBef>
@@ -4159,7 +4297,7 @@
             </a:r>
           </a:p>
           <a:p>
-            <a:pPr lvl="1" marL="416559" indent="-208279" defTabSz="233679">
+            <a:pPr marL="416559" lvl="1" indent="-208279" defTabSz="233679">
               <a:spcBef>
                 <a:spcPts val="1800"/>
               </a:spcBef>
@@ -4176,12 +4314,12 @@
   <p:clrMapOvr>
     <a:masterClrMapping/>
   </p:clrMapOvr>
-  <p:transition xmlns:p14="http://schemas.microsoft.com/office/powerpoint/2010/main" spd="med" advClick="1" p14:dur="1000"/>
+  <p:transition spd="slow"/>
 </p:sld>
 </file>
 
 <file path=ppt/slides/slide16.xml><?xml version="1.0" encoding="utf-8"?>
-<p:sld xmlns:a="http://schemas.openxmlformats.org/drawingml/2006/main" xmlns:r="http://schemas.openxmlformats.org/officeDocument/2006/relationships" xmlns:p="http://schemas.openxmlformats.org/presentationml/2006/main" showMasterSp="1" showMasterPhAnim="1">
+<p:sld xmlns:a="http://schemas.openxmlformats.org/drawingml/2006/main" xmlns:r="http://schemas.openxmlformats.org/officeDocument/2006/relationships" xmlns:p="http://schemas.openxmlformats.org/presentationml/2006/main">
   <p:cSld>
     <p:spTree>
       <p:nvGrpSpPr>
@@ -4200,7 +4338,9 @@
       <p:sp>
         <p:nvSpPr>
           <p:cNvPr id="165" name="Shape 165"/>
-          <p:cNvSpPr/>
+          <p:cNvSpPr>
+            <a:spLocks noGrp="1"/>
+          </p:cNvSpPr>
           <p:nvPr>
             <p:ph type="title"/>
           </p:nvPr>
@@ -4214,7 +4354,6 @@
           <a:bodyPr/>
           <a:lstStyle/>
           <a:p>
-            <a:pPr/>
             <a:r>
               <a:t>session 3</a:t>
             </a:r>
@@ -4224,7 +4363,9 @@
       <p:sp>
         <p:nvSpPr>
           <p:cNvPr id="166" name="Shape 166"/>
-          <p:cNvSpPr/>
+          <p:cNvSpPr>
+            <a:spLocks noGrp="1"/>
+          </p:cNvSpPr>
           <p:nvPr>
             <p:ph type="body" idx="1"/>
           </p:nvPr>
@@ -4238,7 +4379,7 @@
           <a:bodyPr/>
           <a:lstStyle/>
           <a:p>
-            <a:pPr lvl="1" marL="0" indent="171450" defTabSz="438150">
+            <a:pPr marL="0" lvl="1" indent="171450" defTabSz="438150">
               <a:spcBef>
                 <a:spcPts val="3400"/>
               </a:spcBef>
@@ -4256,7 +4397,7 @@
             </a:r>
           </a:p>
           <a:p>
-            <a:pPr lvl="1" marL="781050" indent="-390525" defTabSz="438150">
+            <a:pPr marL="781050" lvl="1" indent="-390525" defTabSz="438150">
               <a:spcBef>
                 <a:spcPts val="3400"/>
               </a:spcBef>
@@ -4267,7 +4408,7 @@
             </a:r>
           </a:p>
           <a:p>
-            <a:pPr lvl="1" marL="781050" indent="-390525" defTabSz="438150">
+            <a:pPr marL="781050" lvl="1" indent="-390525" defTabSz="438150">
               <a:spcBef>
                 <a:spcPts val="3400"/>
               </a:spcBef>
@@ -4278,7 +4419,7 @@
             </a:r>
           </a:p>
           <a:p>
-            <a:pPr lvl="2" marL="1171575" indent="-390525" defTabSz="438150">
+            <a:pPr marL="1171575" lvl="2" indent="-390525" defTabSz="438150">
               <a:spcBef>
                 <a:spcPts val="3400"/>
               </a:spcBef>
@@ -4289,7 +4430,7 @@
             </a:r>
           </a:p>
           <a:p>
-            <a:pPr lvl="2" marL="1171575" indent="-390525" defTabSz="438150">
+            <a:pPr marL="1171575" lvl="2" indent="-390525" defTabSz="438150">
               <a:spcBef>
                 <a:spcPts val="3400"/>
               </a:spcBef>
@@ -4300,7 +4441,7 @@
             </a:r>
           </a:p>
           <a:p>
-            <a:pPr lvl="1" marL="781050" indent="-390525" defTabSz="438150">
+            <a:pPr marL="781050" lvl="1" indent="-390525" defTabSz="438150">
               <a:spcBef>
                 <a:spcPts val="3400"/>
               </a:spcBef>
@@ -4317,12 +4458,12 @@
   <p:clrMapOvr>
     <a:masterClrMapping/>
   </p:clrMapOvr>
-  <p:transition xmlns:p14="http://schemas.microsoft.com/office/powerpoint/2010/main" spd="med" advClick="1" p14:dur="1000"/>
+  <p:transition spd="slow"/>
 </p:sld>
 </file>
 
 <file path=ppt/slides/slide17.xml><?xml version="1.0" encoding="utf-8"?>
-<p:sld xmlns:a="http://schemas.openxmlformats.org/drawingml/2006/main" xmlns:r="http://schemas.openxmlformats.org/officeDocument/2006/relationships" xmlns:p="http://schemas.openxmlformats.org/presentationml/2006/main" showMasterSp="1" showMasterPhAnim="1">
+<p:sld xmlns:a="http://schemas.openxmlformats.org/drawingml/2006/main" xmlns:r="http://schemas.openxmlformats.org/officeDocument/2006/relationships" xmlns:p="http://schemas.openxmlformats.org/presentationml/2006/main">
   <p:cSld>
     <p:spTree>
       <p:nvGrpSpPr>
@@ -4341,7 +4482,9 @@
       <p:sp>
         <p:nvSpPr>
           <p:cNvPr id="168" name="Shape 168"/>
-          <p:cNvSpPr/>
+          <p:cNvSpPr>
+            <a:spLocks noGrp="1"/>
+          </p:cNvSpPr>
           <p:nvPr>
             <p:ph type="title"/>
           </p:nvPr>
@@ -4355,7 +4498,6 @@
           <a:bodyPr/>
           <a:lstStyle/>
           <a:p>
-            <a:pPr/>
             <a:r>
               <a:t>session 3</a:t>
             </a:r>
@@ -4365,7 +4507,9 @@
       <p:sp>
         <p:nvSpPr>
           <p:cNvPr id="169" name="Shape 169"/>
-          <p:cNvSpPr/>
+          <p:cNvSpPr>
+            <a:spLocks noGrp="1"/>
+          </p:cNvSpPr>
           <p:nvPr>
             <p:ph type="body" idx="1"/>
           </p:nvPr>
@@ -4379,7 +4523,7 @@
           <a:bodyPr/>
           <a:lstStyle/>
           <a:p>
-            <a:pPr lvl="1" marL="0" indent="118871" defTabSz="303783">
+            <a:pPr marL="0" lvl="1" indent="118871" defTabSz="303783">
               <a:spcBef>
                 <a:spcPts val="2300"/>
               </a:spcBef>
@@ -4397,7 +4541,7 @@
             </a:r>
           </a:p>
           <a:p>
-            <a:pPr lvl="1" marL="0" indent="118871" defTabSz="303783">
+            <a:pPr marL="0" lvl="1" indent="118871" defTabSz="303783">
               <a:spcBef>
                 <a:spcPts val="2300"/>
               </a:spcBef>
@@ -4410,7 +4554,7 @@
             </a:r>
           </a:p>
           <a:p>
-            <a:pPr lvl="2" marL="812291" indent="-270763" defTabSz="303783">
+            <a:pPr marL="812291" lvl="2" indent="-270763" defTabSz="303783">
               <a:spcBef>
                 <a:spcPts val="2300"/>
               </a:spcBef>
@@ -4424,7 +4568,7 @@
             </a:r>
           </a:p>
           <a:p>
-            <a:pPr lvl="1" marL="0" indent="118871" defTabSz="303783">
+            <a:pPr marL="0" lvl="1" indent="118871" defTabSz="303783">
               <a:spcBef>
                 <a:spcPts val="2300"/>
               </a:spcBef>
@@ -4437,7 +4581,7 @@
             </a:r>
           </a:p>
           <a:p>
-            <a:pPr lvl="1" marL="541527" indent="-270763" defTabSz="303783">
+            <a:pPr marL="541527" lvl="1" indent="-270763" defTabSz="303783">
               <a:spcBef>
                 <a:spcPts val="2300"/>
               </a:spcBef>
@@ -4451,7 +4595,7 @@
             </a:r>
           </a:p>
           <a:p>
-            <a:pPr lvl="1" marL="541527" indent="-270763" defTabSz="303783">
+            <a:pPr marL="541527" lvl="1" indent="-270763" defTabSz="303783">
               <a:spcBef>
                 <a:spcPts val="2300"/>
               </a:spcBef>
@@ -4465,7 +4609,7 @@
             </a:r>
           </a:p>
           <a:p>
-            <a:pPr lvl="1" marL="541527" indent="-270763" defTabSz="303783">
+            <a:pPr marL="541527" lvl="1" indent="-270763" defTabSz="303783">
               <a:spcBef>
                 <a:spcPts val="2300"/>
               </a:spcBef>
@@ -4479,7 +4623,7 @@
             </a:r>
           </a:p>
           <a:p>
-            <a:pPr lvl="1" marL="0" indent="118871" defTabSz="303783">
+            <a:pPr marL="0" lvl="1" indent="118871" defTabSz="303783">
               <a:spcBef>
                 <a:spcPts val="2300"/>
               </a:spcBef>
@@ -4498,12 +4642,12 @@
   <p:clrMapOvr>
     <a:masterClrMapping/>
   </p:clrMapOvr>
-  <p:transition xmlns:p14="http://schemas.microsoft.com/office/powerpoint/2010/main" spd="med" advClick="1" p14:dur="1000"/>
+  <p:transition spd="slow"/>
 </p:sld>
 </file>
 
 <file path=ppt/slides/slide18.xml><?xml version="1.0" encoding="utf-8"?>
-<p:sld xmlns:a="http://schemas.openxmlformats.org/drawingml/2006/main" xmlns:r="http://schemas.openxmlformats.org/officeDocument/2006/relationships" xmlns:p="http://schemas.openxmlformats.org/presentationml/2006/main" showMasterSp="1" showMasterPhAnim="1">
+<p:sld xmlns:a="http://schemas.openxmlformats.org/drawingml/2006/main" xmlns:r="http://schemas.openxmlformats.org/officeDocument/2006/relationships" xmlns:p="http://schemas.openxmlformats.org/presentationml/2006/main">
   <p:cSld>
     <p:spTree>
       <p:nvGrpSpPr>
@@ -4522,7 +4666,9 @@
       <p:sp>
         <p:nvSpPr>
           <p:cNvPr id="171" name="Shape 171"/>
-          <p:cNvSpPr/>
+          <p:cNvSpPr>
+            <a:spLocks noGrp="1"/>
+          </p:cNvSpPr>
           <p:nvPr>
             <p:ph type="title"/>
           </p:nvPr>
@@ -4536,7 +4682,6 @@
           <a:bodyPr/>
           <a:lstStyle/>
           <a:p>
-            <a:pPr/>
             <a:r>
               <a:t>Closing thoughts</a:t>
             </a:r>
@@ -4546,7 +4691,9 @@
       <p:sp>
         <p:nvSpPr>
           <p:cNvPr id="172" name="Shape 172"/>
-          <p:cNvSpPr/>
+          <p:cNvSpPr>
+            <a:spLocks noGrp="1"/>
+          </p:cNvSpPr>
           <p:nvPr>
             <p:ph type="body" idx="1"/>
           </p:nvPr>
@@ -4560,7 +4707,7 @@
           <a:bodyPr/>
           <a:lstStyle/>
           <a:p>
-            <a:pPr lvl="1" marL="760222" indent="-380111" defTabSz="426466">
+            <a:pPr marL="760222" lvl="1" indent="-380111" defTabSz="426466">
               <a:spcBef>
                 <a:spcPts val="3300"/>
               </a:spcBef>
@@ -4571,7 +4718,7 @@
             </a:r>
           </a:p>
           <a:p>
-            <a:pPr lvl="2" marL="1140333" indent="-380111" defTabSz="426466">
+            <a:pPr marL="1140333" lvl="2" indent="-380111" defTabSz="426466">
               <a:spcBef>
                 <a:spcPts val="3300"/>
               </a:spcBef>
@@ -4582,7 +4729,7 @@
             </a:r>
           </a:p>
           <a:p>
-            <a:pPr lvl="2" marL="1140333" indent="-380111" defTabSz="426466">
+            <a:pPr marL="1140333" lvl="2" indent="-380111" defTabSz="426466">
               <a:spcBef>
                 <a:spcPts val="3300"/>
               </a:spcBef>
@@ -4593,7 +4740,7 @@
             </a:r>
           </a:p>
           <a:p>
-            <a:pPr lvl="2" marL="1140333" indent="-380111" defTabSz="426466">
+            <a:pPr marL="1140333" lvl="2" indent="-380111" defTabSz="426466">
               <a:spcBef>
                 <a:spcPts val="3300"/>
               </a:spcBef>
@@ -4604,7 +4751,7 @@
             </a:r>
           </a:p>
           <a:p>
-            <a:pPr lvl="2" marL="1140333" indent="-380111" defTabSz="426466">
+            <a:pPr marL="1140333" lvl="2" indent="-380111" defTabSz="426466">
               <a:spcBef>
                 <a:spcPts val="3300"/>
               </a:spcBef>
@@ -4622,7 +4769,7 @@
             </a:r>
           </a:p>
           <a:p>
-            <a:pPr lvl="2" marL="1140333" indent="-380111" defTabSz="426466">
+            <a:pPr marL="1140333" lvl="2" indent="-380111" defTabSz="426466">
               <a:spcBef>
                 <a:spcPts val="3300"/>
               </a:spcBef>
@@ -4639,12 +4786,12 @@
   <p:clrMapOvr>
     <a:masterClrMapping/>
   </p:clrMapOvr>
-  <p:transition xmlns:p14="http://schemas.microsoft.com/office/powerpoint/2010/main" spd="med" advClick="1" p14:dur="1000"/>
+  <p:transition spd="slow"/>
 </p:sld>
 </file>
 
 <file path=ppt/slides/slide2.xml><?xml version="1.0" encoding="utf-8"?>
-<p:sld xmlns:a="http://schemas.openxmlformats.org/drawingml/2006/main" xmlns:r="http://schemas.openxmlformats.org/officeDocument/2006/relationships" xmlns:p="http://schemas.openxmlformats.org/presentationml/2006/main" showMasterSp="1" showMasterPhAnim="1">
+<p:sld xmlns:a="http://schemas.openxmlformats.org/drawingml/2006/main" xmlns:r="http://schemas.openxmlformats.org/officeDocument/2006/relationships" xmlns:p="http://schemas.openxmlformats.org/presentationml/2006/main">
   <p:cSld>
     <p:spTree>
       <p:nvGrpSpPr>
@@ -4663,7 +4810,9 @@
       <p:sp>
         <p:nvSpPr>
           <p:cNvPr id="123" name="Shape 123"/>
-          <p:cNvSpPr/>
+          <p:cNvSpPr>
+            <a:spLocks noGrp="1"/>
+          </p:cNvSpPr>
           <p:nvPr>
             <p:ph type="title"/>
           </p:nvPr>
@@ -4677,7 +4826,6 @@
           <a:bodyPr/>
           <a:lstStyle/>
           <a:p>
-            <a:pPr/>
             <a:r>
               <a:t>Overview</a:t>
             </a:r>
@@ -4687,7 +4835,9 @@
       <p:sp>
         <p:nvSpPr>
           <p:cNvPr id="124" name="Shape 124"/>
-          <p:cNvSpPr/>
+          <p:cNvSpPr>
+            <a:spLocks noGrp="1"/>
+          </p:cNvSpPr>
           <p:nvPr>
             <p:ph type="body" idx="1"/>
           </p:nvPr>
@@ -4701,13 +4851,11 @@
           <a:bodyPr/>
           <a:lstStyle/>
           <a:p>
-            <a:pPr/>
             <a:r>
               <a:t>MSQF club: thank you for sponsoring!</a:t>
             </a:r>
           </a:p>
           <a:p>
-            <a:pPr/>
             <a:r>
               <a:t>About the seminar:</a:t>
             </a:r>
@@ -4725,12 +4873,12 @@
   <p:clrMapOvr>
     <a:masterClrMapping/>
   </p:clrMapOvr>
-  <p:transition xmlns:p14="http://schemas.microsoft.com/office/powerpoint/2010/main" spd="med" advClick="1" p14:dur="1000"/>
+  <p:transition spd="slow"/>
 </p:sld>
 </file>
 
 <file path=ppt/slides/slide3.xml><?xml version="1.0" encoding="utf-8"?>
-<p:sld xmlns:a="http://schemas.openxmlformats.org/drawingml/2006/main" xmlns:r="http://schemas.openxmlformats.org/officeDocument/2006/relationships" xmlns:p="http://schemas.openxmlformats.org/presentationml/2006/main" showMasterSp="1" showMasterPhAnim="1">
+<p:sld xmlns:a="http://schemas.openxmlformats.org/drawingml/2006/main" xmlns:r="http://schemas.openxmlformats.org/officeDocument/2006/relationships" xmlns:p="http://schemas.openxmlformats.org/presentationml/2006/main">
   <p:cSld>
     <p:spTree>
       <p:nvGrpSpPr>
@@ -4749,7 +4897,9 @@
       <p:sp>
         <p:nvSpPr>
           <p:cNvPr id="126" name="Shape 126"/>
-          <p:cNvSpPr/>
+          <p:cNvSpPr>
+            <a:spLocks noGrp="1"/>
+          </p:cNvSpPr>
           <p:nvPr>
             <p:ph type="title"/>
           </p:nvPr>
@@ -4763,7 +4913,6 @@
           <a:bodyPr/>
           <a:lstStyle/>
           <a:p>
-            <a:pPr/>
             <a:r>
               <a:t>about me</a:t>
             </a:r>
@@ -4773,7 +4922,9 @@
       <p:sp>
         <p:nvSpPr>
           <p:cNvPr id="127" name="Shape 127"/>
-          <p:cNvSpPr/>
+          <p:cNvSpPr>
+            <a:spLocks noGrp="1"/>
+          </p:cNvSpPr>
           <p:nvPr>
             <p:ph type="body" idx="1"/>
           </p:nvPr>
@@ -4820,7 +4971,7 @@
             </a:r>
           </a:p>
           <a:p>
-            <a:pPr lvl="1" marL="541527" indent="-270763" defTabSz="303783">
+            <a:pPr marL="541527" lvl="1" indent="-270763" defTabSz="303783">
               <a:spcBef>
                 <a:spcPts val="2300"/>
               </a:spcBef>
@@ -4831,7 +4982,7 @@
             </a:r>
           </a:p>
           <a:p>
-            <a:pPr lvl="1" marL="541527" indent="-270763" defTabSz="303783">
+            <a:pPr marL="541527" lvl="1" indent="-270763" defTabSz="303783">
               <a:spcBef>
                 <a:spcPts val="2300"/>
               </a:spcBef>
@@ -4842,7 +4993,7 @@
             </a:r>
           </a:p>
           <a:p>
-            <a:pPr lvl="1" marL="541527" indent="-270763" defTabSz="303783">
+            <a:pPr marL="541527" lvl="1" indent="-270763" defTabSz="303783">
               <a:spcBef>
                 <a:spcPts val="2300"/>
               </a:spcBef>
@@ -4853,7 +5004,7 @@
             </a:r>
           </a:p>
           <a:p>
-            <a:pPr lvl="1" marL="541527" indent="-270763" defTabSz="303783">
+            <a:pPr marL="541527" lvl="1" indent="-270763" defTabSz="303783">
               <a:spcBef>
                 <a:spcPts val="2300"/>
               </a:spcBef>
@@ -4890,7 +5041,7 @@
             </a:pPr>
             <a:r>
               <a:rPr u="sng">
-                <a:hlinkClick r:id="rId2" invalidUrl="" action="" tgtFrame="" tooltip="" history="1" highlightClick="0" endSnd="0"/>
+                <a:hlinkClick r:id="rId2"/>
               </a:rPr>
               <a:t>https://www.linkedin.com/in/abelerman</a:t>
             </a:r>
@@ -4902,12 +5053,12 @@
   <p:clrMapOvr>
     <a:masterClrMapping/>
   </p:clrMapOvr>
-  <p:transition xmlns:p14="http://schemas.microsoft.com/office/powerpoint/2010/main" spd="med" advClick="1" p14:dur="1000"/>
+  <p:transition spd="slow"/>
 </p:sld>
 </file>
 
 <file path=ppt/slides/slide4.xml><?xml version="1.0" encoding="utf-8"?>
-<p:sld xmlns:a="http://schemas.openxmlformats.org/drawingml/2006/main" xmlns:r="http://schemas.openxmlformats.org/officeDocument/2006/relationships" xmlns:p="http://schemas.openxmlformats.org/presentationml/2006/main" showMasterSp="1" showMasterPhAnim="1">
+<p:sld xmlns:a="http://schemas.openxmlformats.org/drawingml/2006/main" xmlns:r="http://schemas.openxmlformats.org/officeDocument/2006/relationships" xmlns:p="http://schemas.openxmlformats.org/presentationml/2006/main">
   <p:cSld>
     <p:spTree>
       <p:nvGrpSpPr>
@@ -4926,7 +5077,9 @@
       <p:sp>
         <p:nvSpPr>
           <p:cNvPr id="129" name="Shape 129"/>
-          <p:cNvSpPr/>
+          <p:cNvSpPr>
+            <a:spLocks noGrp="1"/>
+          </p:cNvSpPr>
           <p:nvPr>
             <p:ph type="title"/>
           </p:nvPr>
@@ -4940,7 +5093,6 @@
           <a:bodyPr/>
           <a:lstStyle/>
           <a:p>
-            <a:pPr/>
             <a:r>
               <a:t>What we will cover</a:t>
             </a:r>
@@ -4950,7 +5102,9 @@
       <p:sp>
         <p:nvSpPr>
           <p:cNvPr id="130" name="Shape 130"/>
-          <p:cNvSpPr/>
+          <p:cNvSpPr>
+            <a:spLocks noGrp="1"/>
+          </p:cNvSpPr>
           <p:nvPr>
             <p:ph type="body" idx="1"/>
           </p:nvPr>
@@ -4964,13 +5118,11 @@
           <a:bodyPr/>
           <a:lstStyle/>
           <a:p>
-            <a:pPr/>
             <a:r>
               <a:t>Data science with Python</a:t>
             </a:r>
           </a:p>
           <a:p>
-            <a:pPr/>
             <a:r>
               <a:t>What does this mean?</a:t>
             </a:r>
@@ -4982,12 +5134,12 @@
   <p:clrMapOvr>
     <a:masterClrMapping/>
   </p:clrMapOvr>
-  <p:transition xmlns:p14="http://schemas.microsoft.com/office/powerpoint/2010/main" spd="med" advClick="1" p14:dur="1000"/>
+  <p:transition spd="slow"/>
 </p:sld>
 </file>
 
 <file path=ppt/slides/slide5.xml><?xml version="1.0" encoding="utf-8"?>
-<p:sld xmlns:a="http://schemas.openxmlformats.org/drawingml/2006/main" xmlns:r="http://schemas.openxmlformats.org/officeDocument/2006/relationships" xmlns:p="http://schemas.openxmlformats.org/presentationml/2006/main" showMasterSp="1" showMasterPhAnim="1">
+<p:sld xmlns:a="http://schemas.openxmlformats.org/drawingml/2006/main" xmlns:r="http://schemas.openxmlformats.org/officeDocument/2006/relationships" xmlns:p="http://schemas.openxmlformats.org/presentationml/2006/main">
   <p:cSld>
     <p:spTree>
       <p:nvGrpSpPr>
@@ -5006,7 +5158,9 @@
       <p:sp>
         <p:nvSpPr>
           <p:cNvPr id="132" name="Shape 132"/>
-          <p:cNvSpPr/>
+          <p:cNvSpPr>
+            <a:spLocks noGrp="1"/>
+          </p:cNvSpPr>
           <p:nvPr>
             <p:ph type="title"/>
           </p:nvPr>
@@ -5020,7 +5174,6 @@
           <a:bodyPr/>
           <a:lstStyle/>
           <a:p>
-            <a:pPr/>
             <a:r>
               <a:t>data science</a:t>
             </a:r>
@@ -5030,7 +5183,9 @@
       <p:sp>
         <p:nvSpPr>
           <p:cNvPr id="133" name="Shape 133"/>
-          <p:cNvSpPr/>
+          <p:cNvSpPr>
+            <a:spLocks noGrp="1"/>
+          </p:cNvSpPr>
           <p:nvPr>
             <p:ph type="body" idx="1"/>
           </p:nvPr>
@@ -5066,7 +5221,7 @@
             </a:r>
           </a:p>
           <a:p>
-            <a:pPr lvl="1" marL="541527" indent="-270763" defTabSz="303783">
+            <a:pPr marL="541527" lvl="1" indent="-270763" defTabSz="303783">
               <a:spcBef>
                 <a:spcPts val="2300"/>
               </a:spcBef>
@@ -5077,7 +5232,7 @@
             </a:r>
           </a:p>
           <a:p>
-            <a:pPr lvl="1" marL="541527" indent="-270763" defTabSz="303783">
+            <a:pPr marL="541527" lvl="1" indent="-270763" defTabSz="303783">
               <a:spcBef>
                 <a:spcPts val="2300"/>
               </a:spcBef>
@@ -5088,7 +5243,7 @@
             </a:r>
           </a:p>
           <a:p>
-            <a:pPr lvl="1" marL="541527" indent="-270763" defTabSz="303783">
+            <a:pPr marL="541527" lvl="1" indent="-270763" defTabSz="303783">
               <a:spcBef>
                 <a:spcPts val="2300"/>
               </a:spcBef>
@@ -5099,7 +5254,7 @@
             </a:r>
           </a:p>
           <a:p>
-            <a:pPr lvl="1" marL="541527" indent="-270763" defTabSz="303783">
+            <a:pPr marL="541527" lvl="1" indent="-270763" defTabSz="303783">
               <a:spcBef>
                 <a:spcPts val="2300"/>
               </a:spcBef>
@@ -5110,7 +5265,7 @@
             </a:r>
           </a:p>
           <a:p>
-            <a:pPr lvl="1" marL="541527" indent="-270763" defTabSz="303783">
+            <a:pPr marL="541527" lvl="1" indent="-270763" defTabSz="303783">
               <a:spcBef>
                 <a:spcPts val="2300"/>
               </a:spcBef>
@@ -5121,7 +5276,7 @@
             </a:r>
           </a:p>
           <a:p>
-            <a:pPr lvl="1" marL="541527" indent="-270763" defTabSz="303783">
+            <a:pPr marL="541527" lvl="1" indent="-270763" defTabSz="303783">
               <a:spcBef>
                 <a:spcPts val="2300"/>
               </a:spcBef>
@@ -5132,7 +5287,7 @@
             </a:r>
           </a:p>
           <a:p>
-            <a:pPr lvl="1" marL="541527" indent="-270763" defTabSz="303783">
+            <a:pPr marL="541527" lvl="1" indent="-270763" defTabSz="303783">
               <a:spcBef>
                 <a:spcPts val="2300"/>
               </a:spcBef>
@@ -5149,12 +5304,12 @@
   <p:clrMapOvr>
     <a:masterClrMapping/>
   </p:clrMapOvr>
-  <p:transition xmlns:p14="http://schemas.microsoft.com/office/powerpoint/2010/main" spd="med" advClick="1" p14:dur="1000"/>
+  <p:transition spd="slow"/>
 </p:sld>
 </file>
 
 <file path=ppt/slides/slide6.xml><?xml version="1.0" encoding="utf-8"?>
-<p:sld xmlns:a="http://schemas.openxmlformats.org/drawingml/2006/main" xmlns:r="http://schemas.openxmlformats.org/officeDocument/2006/relationships" xmlns:p="http://schemas.openxmlformats.org/presentationml/2006/main" showMasterSp="1" showMasterPhAnim="1">
+<p:sld xmlns:a="http://schemas.openxmlformats.org/drawingml/2006/main" xmlns:r="http://schemas.openxmlformats.org/officeDocument/2006/relationships" xmlns:p="http://schemas.openxmlformats.org/presentationml/2006/main">
   <p:cSld>
     <p:spTree>
       <p:nvGrpSpPr>
@@ -5173,7 +5328,9 @@
       <p:sp>
         <p:nvSpPr>
           <p:cNvPr id="135" name="Shape 135"/>
-          <p:cNvSpPr/>
+          <p:cNvSpPr>
+            <a:spLocks noGrp="1"/>
+          </p:cNvSpPr>
           <p:nvPr>
             <p:ph type="title"/>
           </p:nvPr>
@@ -5187,7 +5344,6 @@
           <a:bodyPr/>
           <a:lstStyle/>
           <a:p>
-            <a:pPr/>
             <a:r>
               <a:t>More on Data science</a:t>
             </a:r>
@@ -5197,7 +5353,9 @@
       <p:sp>
         <p:nvSpPr>
           <p:cNvPr id="136" name="Shape 136"/>
-          <p:cNvSpPr/>
+          <p:cNvSpPr>
+            <a:spLocks noGrp="1"/>
+          </p:cNvSpPr>
           <p:nvPr>
             <p:ph type="body" idx="1"/>
           </p:nvPr>
@@ -5234,7 +5392,7 @@
             </a:r>
           </a:p>
           <a:p>
-            <a:pPr lvl="1" marL="770636" indent="-385318" defTabSz="432308">
+            <a:pPr marL="770636" lvl="1" indent="-385318" defTabSz="432308">
               <a:spcBef>
                 <a:spcPts val="3400"/>
               </a:spcBef>
@@ -5245,7 +5403,7 @@
             </a:r>
           </a:p>
           <a:p>
-            <a:pPr lvl="1" marL="770636" indent="-385318" defTabSz="432308">
+            <a:pPr marL="770636" lvl="1" indent="-385318" defTabSz="432308">
               <a:spcBef>
                 <a:spcPts val="3400"/>
               </a:spcBef>
@@ -5256,7 +5414,7 @@
             </a:r>
           </a:p>
           <a:p>
-            <a:pPr lvl="1" marL="770636" indent="-385318" defTabSz="432308">
+            <a:pPr marL="770636" lvl="1" indent="-385318" defTabSz="432308">
               <a:spcBef>
                 <a:spcPts val="3400"/>
               </a:spcBef>
@@ -5267,7 +5425,7 @@
             </a:r>
           </a:p>
           <a:p>
-            <a:pPr lvl="1" marL="770636" indent="-385318" defTabSz="432308">
+            <a:pPr marL="770636" lvl="1" indent="-385318" defTabSz="432308">
               <a:spcBef>
                 <a:spcPts val="3400"/>
               </a:spcBef>
@@ -5284,12 +5442,12 @@
   <p:clrMapOvr>
     <a:masterClrMapping/>
   </p:clrMapOvr>
-  <p:transition xmlns:p14="http://schemas.microsoft.com/office/powerpoint/2010/main" spd="med" advClick="1" p14:dur="1000"/>
+  <p:transition spd="slow"/>
 </p:sld>
 </file>
 
 <file path=ppt/slides/slide7.xml><?xml version="1.0" encoding="utf-8"?>
-<p:sld xmlns:a="http://schemas.openxmlformats.org/drawingml/2006/main" xmlns:r="http://schemas.openxmlformats.org/officeDocument/2006/relationships" xmlns:p="http://schemas.openxmlformats.org/presentationml/2006/main" showMasterSp="1" showMasterPhAnim="1">
+<p:sld xmlns:a="http://schemas.openxmlformats.org/drawingml/2006/main" xmlns:r="http://schemas.openxmlformats.org/officeDocument/2006/relationships" xmlns:p="http://schemas.openxmlformats.org/presentationml/2006/main">
   <p:cSld>
     <p:spTree>
       <p:nvGrpSpPr>
@@ -5308,7 +5466,9 @@
       <p:sp>
         <p:nvSpPr>
           <p:cNvPr id="138" name="Shape 138"/>
-          <p:cNvSpPr/>
+          <p:cNvSpPr>
+            <a:spLocks noGrp="1"/>
+          </p:cNvSpPr>
           <p:nvPr>
             <p:ph type="title"/>
           </p:nvPr>
@@ -5322,7 +5482,6 @@
           <a:bodyPr/>
           <a:lstStyle/>
           <a:p>
-            <a:pPr/>
             <a:r>
               <a:t>Python</a:t>
             </a:r>
@@ -5332,7 +5491,9 @@
       <p:sp>
         <p:nvSpPr>
           <p:cNvPr id="139" name="Shape 139"/>
-          <p:cNvSpPr/>
+          <p:cNvSpPr>
+            <a:spLocks noGrp="1"/>
+          </p:cNvSpPr>
           <p:nvPr>
             <p:ph type="body" idx="1"/>
           </p:nvPr>
@@ -5357,7 +5518,7 @@
             </a:r>
           </a:p>
           <a:p>
-            <a:pPr lvl="1" marL="562356" indent="-281178" defTabSz="315468">
+            <a:pPr marL="562356" lvl="1" indent="-281178" defTabSz="315468">
               <a:spcBef>
                 <a:spcPts val="2400"/>
               </a:spcBef>
@@ -5368,7 +5529,7 @@
             </a:r>
           </a:p>
           <a:p>
-            <a:pPr lvl="1" marL="562356" indent="-281178" defTabSz="315468">
+            <a:pPr marL="562356" lvl="1" indent="-281178" defTabSz="315468">
               <a:spcBef>
                 <a:spcPts val="2400"/>
               </a:spcBef>
@@ -5376,7 +5537,7 @@
             </a:pPr>
             <a:r>
               <a:rPr u="sng">
-                <a:hlinkClick r:id="rId2" invalidUrl="" action="" tgtFrame="" tooltip="" history="1" highlightClick="0" endSnd="0"/>
+                <a:hlinkClick r:id="rId2"/>
               </a:rPr>
               <a:t>https://www.python.org/</a:t>
             </a:r>
@@ -5393,7 +5554,7 @@
             </a:r>
           </a:p>
           <a:p>
-            <a:pPr lvl="1" marL="562356" indent="-281178" defTabSz="315468">
+            <a:pPr marL="562356" lvl="1" indent="-281178" defTabSz="315468">
               <a:spcBef>
                 <a:spcPts val="2400"/>
               </a:spcBef>
@@ -5404,7 +5565,7 @@
             </a:r>
           </a:p>
           <a:p>
-            <a:pPr lvl="1" marL="562356" indent="-281178" defTabSz="315468">
+            <a:pPr marL="562356" lvl="1" indent="-281178" defTabSz="315468">
               <a:spcBef>
                 <a:spcPts val="2400"/>
               </a:spcBef>
@@ -5415,7 +5576,7 @@
             </a:r>
           </a:p>
           <a:p>
-            <a:pPr lvl="1" marL="562356" indent="-281178" defTabSz="315468">
+            <a:pPr marL="562356" lvl="1" indent="-281178" defTabSz="315468">
               <a:spcBef>
                 <a:spcPts val="2400"/>
               </a:spcBef>
@@ -5423,7 +5584,7 @@
             </a:pPr>
             <a:r>
               <a:rPr u="sng">
-                <a:hlinkClick r:id="rId3" invalidUrl="" action="" tgtFrame="" tooltip="" history="1" highlightClick="0" endSnd="0"/>
+                <a:hlinkClick r:id="rId3"/>
               </a:rPr>
               <a:t>https://en.wikipedia.org/wiki/Python_(programming_language)</a:t>
             </a:r>
@@ -5435,12 +5596,12 @@
   <p:clrMapOvr>
     <a:masterClrMapping/>
   </p:clrMapOvr>
-  <p:transition xmlns:p14="http://schemas.microsoft.com/office/powerpoint/2010/main" spd="med" advClick="1" p14:dur="1000"/>
+  <p:transition spd="slow"/>
 </p:sld>
 </file>
 
 <file path=ppt/slides/slide8.xml><?xml version="1.0" encoding="utf-8"?>
-<p:sld xmlns:a="http://schemas.openxmlformats.org/drawingml/2006/main" xmlns:r="http://schemas.openxmlformats.org/officeDocument/2006/relationships" xmlns:p="http://schemas.openxmlformats.org/presentationml/2006/main" showMasterSp="1" showMasterPhAnim="1">
+<p:sld xmlns:a="http://schemas.openxmlformats.org/drawingml/2006/main" xmlns:r="http://schemas.openxmlformats.org/officeDocument/2006/relationships" xmlns:p="http://schemas.openxmlformats.org/presentationml/2006/main">
   <p:cSld>
     <p:spTree>
       <p:nvGrpSpPr>
@@ -5459,7 +5620,9 @@
       <p:sp>
         <p:nvSpPr>
           <p:cNvPr id="141" name="Shape 141"/>
-          <p:cNvSpPr/>
+          <p:cNvSpPr>
+            <a:spLocks noGrp="1"/>
+          </p:cNvSpPr>
           <p:nvPr>
             <p:ph type="title"/>
           </p:nvPr>
@@ -5473,7 +5636,6 @@
           <a:bodyPr/>
           <a:lstStyle/>
           <a:p>
-            <a:pPr/>
             <a:r>
               <a:t>More on Python</a:t>
             </a:r>
@@ -5483,7 +5645,9 @@
       <p:sp>
         <p:nvSpPr>
           <p:cNvPr id="142" name="Shape 142"/>
-          <p:cNvSpPr/>
+          <p:cNvSpPr>
+            <a:spLocks noGrp="1"/>
+          </p:cNvSpPr>
           <p:nvPr>
             <p:ph type="body" idx="1"/>
           </p:nvPr>
@@ -5517,7 +5681,7 @@
             </a:r>
           </a:p>
           <a:p>
-            <a:pPr lvl="1" marL="614425" indent="-307212" defTabSz="344677">
+            <a:pPr marL="614425" lvl="1" indent="-307212" defTabSz="344677">
               <a:spcBef>
                 <a:spcPts val="2700"/>
               </a:spcBef>
@@ -5528,7 +5692,7 @@
             </a:r>
           </a:p>
           <a:p>
-            <a:pPr lvl="2" marL="921638" indent="-307212" defTabSz="344677">
+            <a:pPr marL="921638" lvl="2" indent="-307212" defTabSz="344677">
               <a:spcBef>
                 <a:spcPts val="2700"/>
               </a:spcBef>
@@ -5539,7 +5703,7 @@
             </a:r>
           </a:p>
           <a:p>
-            <a:pPr lvl="2" marL="921638" indent="-307212" defTabSz="344677">
+            <a:pPr marL="921638" lvl="2" indent="-307212" defTabSz="344677">
               <a:spcBef>
                 <a:spcPts val="2700"/>
               </a:spcBef>
@@ -5554,7 +5718,7 @@
             </a:r>
           </a:p>
           <a:p>
-            <a:pPr lvl="2" marL="921638" indent="-307212" defTabSz="344677">
+            <a:pPr marL="921638" lvl="2" indent="-307212" defTabSz="344677">
               <a:spcBef>
                 <a:spcPts val="2700"/>
               </a:spcBef>
@@ -5565,7 +5729,7 @@
             </a:r>
           </a:p>
           <a:p>
-            <a:pPr lvl="3" marL="1228851" indent="-307212" defTabSz="344677">
+            <a:pPr marL="1228851" lvl="3" indent="-307212" defTabSz="344677">
               <a:spcBef>
                 <a:spcPts val="2700"/>
               </a:spcBef>
@@ -5573,13 +5737,13 @@
             </a:pPr>
             <a:r>
               <a:rPr u="sng">
-                <a:hlinkClick r:id="rId2" invalidUrl="" action="" tgtFrame="" tooltip="" history="1" highlightClick="0" endSnd="0"/>
+                <a:hlinkClick r:id="rId2"/>
               </a:rPr>
               <a:t>https://jeffknupp.com/blog/2012/11/13/is-python-callbyvalue-or-callbyreference-neither/</a:t>
             </a:r>
           </a:p>
           <a:p>
-            <a:pPr lvl="2" marL="921638" indent="-307212" defTabSz="344677">
+            <a:pPr marL="921638" lvl="2" indent="-307212" defTabSz="344677">
               <a:spcBef>
                 <a:spcPts val="2700"/>
               </a:spcBef>
@@ -5596,12 +5760,12 @@
   <p:clrMapOvr>
     <a:masterClrMapping/>
   </p:clrMapOvr>
-  <p:transition xmlns:p14="http://schemas.microsoft.com/office/powerpoint/2010/main" spd="med" advClick="1" p14:dur="1000"/>
+  <p:transition spd="slow"/>
 </p:sld>
 </file>
 
 <file path=ppt/slides/slide9.xml><?xml version="1.0" encoding="utf-8"?>
-<p:sld xmlns:a="http://schemas.openxmlformats.org/drawingml/2006/main" xmlns:r="http://schemas.openxmlformats.org/officeDocument/2006/relationships" xmlns:p="http://schemas.openxmlformats.org/presentationml/2006/main" showMasterSp="1" showMasterPhAnim="1">
+<p:sld xmlns:a="http://schemas.openxmlformats.org/drawingml/2006/main" xmlns:r="http://schemas.openxmlformats.org/officeDocument/2006/relationships" xmlns:p="http://schemas.openxmlformats.org/presentationml/2006/main">
   <p:cSld>
     <p:spTree>
       <p:nvGrpSpPr>
@@ -5620,7 +5784,9 @@
       <p:sp>
         <p:nvSpPr>
           <p:cNvPr id="144" name="Shape 144"/>
-          <p:cNvSpPr/>
+          <p:cNvSpPr>
+            <a:spLocks noGrp="1"/>
+          </p:cNvSpPr>
           <p:nvPr>
             <p:ph type="title"/>
           </p:nvPr>
@@ -5634,7 +5800,6 @@
           <a:bodyPr/>
           <a:lstStyle/>
           <a:p>
-            <a:pPr/>
             <a:r>
               <a:t>More on Python</a:t>
             </a:r>
@@ -5644,7 +5809,9 @@
       <p:sp>
         <p:nvSpPr>
           <p:cNvPr id="145" name="Shape 145"/>
-          <p:cNvSpPr/>
+          <p:cNvSpPr>
+            <a:spLocks noGrp="1"/>
+          </p:cNvSpPr>
           <p:nvPr>
             <p:ph type="body" idx="1"/>
           </p:nvPr>
@@ -5678,7 +5845,7 @@
             </a:r>
           </a:p>
           <a:p>
-            <a:pPr lvl="1" marL="656081" indent="-328040" defTabSz="368045">
+            <a:pPr marL="656081" lvl="1" indent="-328040" defTabSz="368045">
               <a:spcBef>
                 <a:spcPts val="2800"/>
               </a:spcBef>
@@ -5701,7 +5868,7 @@
             </a:r>
           </a:p>
           <a:p>
-            <a:pPr lvl="2" marL="984122" indent="-328040" defTabSz="368045">
+            <a:pPr marL="984122" lvl="2" indent="-328040" defTabSz="368045">
               <a:spcBef>
                 <a:spcPts val="2800"/>
               </a:spcBef>
@@ -5712,7 +5879,7 @@
             </a:r>
           </a:p>
           <a:p>
-            <a:pPr lvl="2" marL="984122" indent="-328040" defTabSz="368045">
+            <a:pPr marL="984122" lvl="2" indent="-328040" defTabSz="368045">
               <a:spcBef>
                 <a:spcPts val="2800"/>
               </a:spcBef>
@@ -5723,7 +5890,7 @@
             </a:r>
           </a:p>
           <a:p>
-            <a:pPr lvl="2" marL="984122" indent="-328040" defTabSz="368045">
+            <a:pPr marL="984122" lvl="2" indent="-328040" defTabSz="368045">
               <a:spcBef>
                 <a:spcPts val="2800"/>
               </a:spcBef>
@@ -5734,7 +5901,7 @@
             </a:r>
           </a:p>
           <a:p>
-            <a:pPr lvl="2" marL="984122" indent="-328040" defTabSz="368045">
+            <a:pPr marL="984122" lvl="2" indent="-328040" defTabSz="368045">
               <a:spcBef>
                 <a:spcPts val="2800"/>
               </a:spcBef>
@@ -5745,7 +5912,7 @@
             </a:r>
           </a:p>
           <a:p>
-            <a:pPr lvl="2" marL="984122" indent="-328040" defTabSz="368045">
+            <a:pPr marL="984122" lvl="2" indent="-328040" defTabSz="368045">
               <a:spcBef>
                 <a:spcPts val="2800"/>
               </a:spcBef>
@@ -5762,12 +5929,12 @@
   <p:clrMapOvr>
     <a:masterClrMapping/>
   </p:clrMapOvr>
-  <p:transition xmlns:p14="http://schemas.microsoft.com/office/powerpoint/2010/main" spd="med" advClick="1" p14:dur="1000"/>
+  <p:transition spd="slow"/>
 </p:sld>
 </file>
 
 <file path=ppt/theme/theme1.xml><?xml version="1.0" encoding="utf-8"?>
-<a:theme xmlns:a="http://schemas.openxmlformats.org/drawingml/2006/main" xmlns:r="http://schemas.openxmlformats.org/officeDocument/2006/relationships" name="Showroom">
+<a:theme xmlns:a="http://schemas.openxmlformats.org/drawingml/2006/main" name="Showroom">
   <a:themeElements>
     <a:clrScheme name="Showroom">
       <a:dk1>
@@ -5966,7 +6133,7 @@
         <a:effectLst/>
         <a:sp3d/>
       </a:spPr>
-      <a:bodyPr rot="0" spcFirstLastPara="1" vertOverflow="overflow" horzOverflow="overflow" vert="horz" wrap="square" lIns="50800" tIns="50800" rIns="50800" bIns="50800" numCol="1" spcCol="38100" rtlCol="0" anchor="ctr" upright="0">
+      <a:bodyPr rot="0" spcFirstLastPara="1" vertOverflow="overflow" horzOverflow="overflow" vert="horz" wrap="square" lIns="50800" tIns="50800" rIns="50800" bIns="50800" numCol="1" spcCol="38100" rtlCol="0" anchor="ctr">
         <a:spAutoFit/>
       </a:bodyPr>
       <a:lstStyle>
@@ -5985,7 +6152,7 @@
           <a:buFontTx/>
           <a:buNone/>
           <a:tabLst/>
-          <a:defRPr b="0" baseline="0" cap="none" i="0" spc="0" strike="noStrike" sz="3600" u="none" kumimoji="0" normalizeH="0">
+          <a:defRPr kumimoji="0" sz="3600" b="0" i="0" u="none" strike="noStrike" cap="none" spc="0" normalizeH="0" baseline="0">
             <a:ln>
               <a:noFill/>
             </a:ln>
@@ -6015,7 +6182,7 @@
           <a:buFontTx/>
           <a:buNone/>
           <a:tabLst/>
-          <a:defRPr b="0" baseline="0" cap="none" i="0" spc="0" strike="noStrike" sz="1800" u="none" kumimoji="0" normalizeH="0">
+          <a:defRPr kumimoji="0" sz="1800" b="0" i="0" u="none" strike="noStrike" cap="none" spc="0" normalizeH="0" baseline="0">
             <a:ln>
               <a:noFill/>
             </a:ln>
@@ -6041,7 +6208,7 @@
           <a:buFontTx/>
           <a:buNone/>
           <a:tabLst/>
-          <a:defRPr b="0" baseline="0" cap="none" i="0" spc="0" strike="noStrike" sz="1800" u="none" kumimoji="0" normalizeH="0">
+          <a:defRPr kumimoji="0" sz="1800" b="0" i="0" u="none" strike="noStrike" cap="none" spc="0" normalizeH="0" baseline="0">
             <a:ln>
               <a:noFill/>
             </a:ln>
@@ -6067,7 +6234,7 @@
           <a:buFontTx/>
           <a:buNone/>
           <a:tabLst/>
-          <a:defRPr b="0" baseline="0" cap="none" i="0" spc="0" strike="noStrike" sz="1800" u="none" kumimoji="0" normalizeH="0">
+          <a:defRPr kumimoji="0" sz="1800" b="0" i="0" u="none" strike="noStrike" cap="none" spc="0" normalizeH="0" baseline="0">
             <a:ln>
               <a:noFill/>
             </a:ln>
@@ -6093,7 +6260,7 @@
           <a:buFontTx/>
           <a:buNone/>
           <a:tabLst/>
-          <a:defRPr b="0" baseline="0" cap="none" i="0" spc="0" strike="noStrike" sz="1800" u="none" kumimoji="0" normalizeH="0">
+          <a:defRPr kumimoji="0" sz="1800" b="0" i="0" u="none" strike="noStrike" cap="none" spc="0" normalizeH="0" baseline="0">
             <a:ln>
               <a:noFill/>
             </a:ln>
@@ -6119,7 +6286,7 @@
           <a:buFontTx/>
           <a:buNone/>
           <a:tabLst/>
-          <a:defRPr b="0" baseline="0" cap="none" i="0" spc="0" strike="noStrike" sz="1800" u="none" kumimoji="0" normalizeH="0">
+          <a:defRPr kumimoji="0" sz="1800" b="0" i="0" u="none" strike="noStrike" cap="none" spc="0" normalizeH="0" baseline="0">
             <a:ln>
               <a:noFill/>
             </a:ln>
@@ -6145,7 +6312,7 @@
           <a:buFontTx/>
           <a:buNone/>
           <a:tabLst/>
-          <a:defRPr b="0" baseline="0" cap="none" i="0" spc="0" strike="noStrike" sz="1800" u="none" kumimoji="0" normalizeH="0">
+          <a:defRPr kumimoji="0" sz="1800" b="0" i="0" u="none" strike="noStrike" cap="none" spc="0" normalizeH="0" baseline="0">
             <a:ln>
               <a:noFill/>
             </a:ln>
@@ -6171,7 +6338,7 @@
           <a:buFontTx/>
           <a:buNone/>
           <a:tabLst/>
-          <a:defRPr b="0" baseline="0" cap="none" i="0" spc="0" strike="noStrike" sz="1800" u="none" kumimoji="0" normalizeH="0">
+          <a:defRPr kumimoji="0" sz="1800" b="0" i="0" u="none" strike="noStrike" cap="none" spc="0" normalizeH="0" baseline="0">
             <a:ln>
               <a:noFill/>
             </a:ln>
@@ -6197,7 +6364,7 @@
           <a:buFontTx/>
           <a:buNone/>
           <a:tabLst/>
-          <a:defRPr b="0" baseline="0" cap="none" i="0" spc="0" strike="noStrike" sz="1800" u="none" kumimoji="0" normalizeH="0">
+          <a:defRPr kumimoji="0" sz="1800" b="0" i="0" u="none" strike="noStrike" cap="none" spc="0" normalizeH="0" baseline="0">
             <a:ln>
               <a:noFill/>
             </a:ln>
@@ -6223,7 +6390,7 @@
           <a:buFontTx/>
           <a:buNone/>
           <a:tabLst/>
-          <a:defRPr b="0" baseline="0" cap="none" i="0" spc="0" strike="noStrike" sz="1800" u="none" kumimoji="0" normalizeH="0">
+          <a:defRPr kumimoji="0" sz="1800" b="0" i="0" u="none" strike="noStrike" cap="none" spc="0" normalizeH="0" baseline="0">
             <a:ln>
               <a:noFill/>
             </a:ln>
@@ -6236,9 +6403,15 @@
         </a:lvl9pPr>
       </a:lstStyle>
       <a:style>
-        <a:lnRef idx="0"/>
-        <a:fillRef idx="0"/>
-        <a:effectRef idx="0"/>
+        <a:lnRef idx="0">
+          <a:scrgbClr r="0" g="0" b="0"/>
+        </a:lnRef>
+        <a:fillRef idx="0">
+          <a:scrgbClr r="0" g="0" b="0"/>
+        </a:fillRef>
+        <a:effectRef idx="0">
+          <a:scrgbClr r="0" g="0" b="0"/>
+        </a:effectRef>
         <a:fontRef idx="none"/>
       </a:style>
     </a:spDef>
@@ -6255,7 +6428,7 @@
         <a:effectLst/>
         <a:sp3d/>
       </a:spPr>
-      <a:bodyPr rot="0" spcFirstLastPara="1" vertOverflow="overflow" horzOverflow="overflow" vert="horz" wrap="square" lIns="91439" tIns="45719" rIns="91439" bIns="45719" numCol="1" spcCol="38100" rtlCol="0" anchor="t" upright="0">
+      <a:bodyPr rot="0" spcFirstLastPara="1" vertOverflow="overflow" horzOverflow="overflow" vert="horz" wrap="square" lIns="91439" tIns="45719" rIns="91439" bIns="45719" numCol="1" spcCol="38100" rtlCol="0" anchor="t">
         <a:noAutofit/>
       </a:bodyPr>
       <a:lstStyle>
@@ -6274,7 +6447,7 @@
           <a:buFontTx/>
           <a:buNone/>
           <a:tabLst/>
-          <a:defRPr b="0" baseline="0" cap="none" i="0" spc="0" strike="noStrike" sz="1800" u="none" kumimoji="0" normalizeH="0">
+          <a:defRPr kumimoji="0" sz="1800" b="0" i="0" u="none" strike="noStrike" cap="none" spc="0" normalizeH="0" baseline="0">
             <a:ln>
               <a:noFill/>
             </a:ln>
@@ -6300,7 +6473,7 @@
           <a:buFontTx/>
           <a:buNone/>
           <a:tabLst/>
-          <a:defRPr b="0" baseline="0" cap="none" i="0" spc="0" strike="noStrike" sz="1800" u="none" kumimoji="0" normalizeH="0">
+          <a:defRPr kumimoji="0" sz="1800" b="0" i="0" u="none" strike="noStrike" cap="none" spc="0" normalizeH="0" baseline="0">
             <a:ln>
               <a:noFill/>
             </a:ln>
@@ -6326,7 +6499,7 @@
           <a:buFontTx/>
           <a:buNone/>
           <a:tabLst/>
-          <a:defRPr b="0" baseline="0" cap="none" i="0" spc="0" strike="noStrike" sz="1800" u="none" kumimoji="0" normalizeH="0">
+          <a:defRPr kumimoji="0" sz="1800" b="0" i="0" u="none" strike="noStrike" cap="none" spc="0" normalizeH="0" baseline="0">
             <a:ln>
               <a:noFill/>
             </a:ln>
@@ -6352,7 +6525,7 @@
           <a:buFontTx/>
           <a:buNone/>
           <a:tabLst/>
-          <a:defRPr b="0" baseline="0" cap="none" i="0" spc="0" strike="noStrike" sz="1800" u="none" kumimoji="0" normalizeH="0">
+          <a:defRPr kumimoji="0" sz="1800" b="0" i="0" u="none" strike="noStrike" cap="none" spc="0" normalizeH="0" baseline="0">
             <a:ln>
               <a:noFill/>
             </a:ln>
@@ -6378,7 +6551,7 @@
           <a:buFontTx/>
           <a:buNone/>
           <a:tabLst/>
-          <a:defRPr b="0" baseline="0" cap="none" i="0" spc="0" strike="noStrike" sz="1800" u="none" kumimoji="0" normalizeH="0">
+          <a:defRPr kumimoji="0" sz="1800" b="0" i="0" u="none" strike="noStrike" cap="none" spc="0" normalizeH="0" baseline="0">
             <a:ln>
               <a:noFill/>
             </a:ln>
@@ -6404,7 +6577,7 @@
           <a:buFontTx/>
           <a:buNone/>
           <a:tabLst/>
-          <a:defRPr b="0" baseline="0" cap="none" i="0" spc="0" strike="noStrike" sz="1800" u="none" kumimoji="0" normalizeH="0">
+          <a:defRPr kumimoji="0" sz="1800" b="0" i="0" u="none" strike="noStrike" cap="none" spc="0" normalizeH="0" baseline="0">
             <a:ln>
               <a:noFill/>
             </a:ln>
@@ -6430,7 +6603,7 @@
           <a:buFontTx/>
           <a:buNone/>
           <a:tabLst/>
-          <a:defRPr b="0" baseline="0" cap="none" i="0" spc="0" strike="noStrike" sz="1800" u="none" kumimoji="0" normalizeH="0">
+          <a:defRPr kumimoji="0" sz="1800" b="0" i="0" u="none" strike="noStrike" cap="none" spc="0" normalizeH="0" baseline="0">
             <a:ln>
               <a:noFill/>
             </a:ln>
@@ -6456,7 +6629,7 @@
           <a:buFontTx/>
           <a:buNone/>
           <a:tabLst/>
-          <a:defRPr b="0" baseline="0" cap="none" i="0" spc="0" strike="noStrike" sz="1800" u="none" kumimoji="0" normalizeH="0">
+          <a:defRPr kumimoji="0" sz="1800" b="0" i="0" u="none" strike="noStrike" cap="none" spc="0" normalizeH="0" baseline="0">
             <a:ln>
               <a:noFill/>
             </a:ln>
@@ -6482,7 +6655,7 @@
           <a:buFontTx/>
           <a:buNone/>
           <a:tabLst/>
-          <a:defRPr b="0" baseline="0" cap="none" i="0" spc="0" strike="noStrike" sz="1800" u="none" kumimoji="0" normalizeH="0">
+          <a:defRPr kumimoji="0" sz="1800" b="0" i="0" u="none" strike="noStrike" cap="none" spc="0" normalizeH="0" baseline="0">
             <a:ln>
               <a:noFill/>
             </a:ln>
@@ -6508,7 +6681,7 @@
           <a:buFontTx/>
           <a:buNone/>
           <a:tabLst/>
-          <a:defRPr b="0" baseline="0" cap="none" i="0" spc="0" strike="noStrike" sz="1800" u="none" kumimoji="0" normalizeH="0">
+          <a:defRPr kumimoji="0" sz="1800" b="0" i="0" u="none" strike="noStrike" cap="none" spc="0" normalizeH="0" baseline="0">
             <a:ln>
               <a:noFill/>
             </a:ln>
@@ -6521,9 +6694,15 @@
         </a:lvl9pPr>
       </a:lstStyle>
       <a:style>
-        <a:lnRef idx="0"/>
-        <a:fillRef idx="0"/>
-        <a:effectRef idx="0"/>
+        <a:lnRef idx="0">
+          <a:scrgbClr r="0" g="0" b="0"/>
+        </a:lnRef>
+        <a:fillRef idx="0">
+          <a:scrgbClr r="0" g="0" b="0"/>
+        </a:fillRef>
+        <a:effectRef idx="0">
+          <a:scrgbClr r="0" g="0" b="0"/>
+        </a:effectRef>
         <a:fontRef idx="none"/>
       </a:style>
     </a:lnDef>
@@ -6537,7 +6716,7 @@
         <a:effectLst/>
         <a:sp3d/>
       </a:spPr>
-      <a:bodyPr rot="0" spcFirstLastPara="1" vertOverflow="overflow" horzOverflow="overflow" vert="horz" wrap="square" lIns="50800" tIns="50800" rIns="50800" bIns="50800" numCol="1" spcCol="38100" rtlCol="0" anchor="ctr" upright="0">
+      <a:bodyPr rot="0" spcFirstLastPara="1" vertOverflow="overflow" horzOverflow="overflow" vert="horz" wrap="square" lIns="50800" tIns="50800" rIns="50800" bIns="50800" numCol="1" spcCol="38100" rtlCol="0" anchor="ctr">
         <a:spAutoFit/>
       </a:bodyPr>
       <a:lstStyle>
@@ -6556,7 +6735,7 @@
           <a:buFontTx/>
           <a:buNone/>
           <a:tabLst/>
-          <a:defRPr b="0" baseline="0" cap="none" i="0" spc="0" strike="noStrike" sz="3600" u="none" kumimoji="0" normalizeH="0">
+          <a:defRPr kumimoji="0" sz="3600" b="0" i="0" u="none" strike="noStrike" cap="none" spc="0" normalizeH="0" baseline="0">
             <a:ln>
               <a:noFill/>
             </a:ln>
@@ -6586,7 +6765,7 @@
           <a:buFontTx/>
           <a:buNone/>
           <a:tabLst/>
-          <a:defRPr b="0" baseline="0" cap="none" i="0" spc="0" strike="noStrike" sz="1800" u="none" kumimoji="0" normalizeH="0">
+          <a:defRPr kumimoji="0" sz="1800" b="0" i="0" u="none" strike="noStrike" cap="none" spc="0" normalizeH="0" baseline="0">
             <a:ln>
               <a:noFill/>
             </a:ln>
@@ -6612,7 +6791,7 @@
           <a:buFontTx/>
           <a:buNone/>
           <a:tabLst/>
-          <a:defRPr b="0" baseline="0" cap="none" i="0" spc="0" strike="noStrike" sz="1800" u="none" kumimoji="0" normalizeH="0">
+          <a:defRPr kumimoji="0" sz="1800" b="0" i="0" u="none" strike="noStrike" cap="none" spc="0" normalizeH="0" baseline="0">
             <a:ln>
               <a:noFill/>
             </a:ln>
@@ -6638,7 +6817,7 @@
           <a:buFontTx/>
           <a:buNone/>
           <a:tabLst/>
-          <a:defRPr b="0" baseline="0" cap="none" i="0" spc="0" strike="noStrike" sz="1800" u="none" kumimoji="0" normalizeH="0">
+          <a:defRPr kumimoji="0" sz="1800" b="0" i="0" u="none" strike="noStrike" cap="none" spc="0" normalizeH="0" baseline="0">
             <a:ln>
               <a:noFill/>
             </a:ln>
@@ -6664,7 +6843,7 @@
           <a:buFontTx/>
           <a:buNone/>
           <a:tabLst/>
-          <a:defRPr b="0" baseline="0" cap="none" i="0" spc="0" strike="noStrike" sz="1800" u="none" kumimoji="0" normalizeH="0">
+          <a:defRPr kumimoji="0" sz="1800" b="0" i="0" u="none" strike="noStrike" cap="none" spc="0" normalizeH="0" baseline="0">
             <a:ln>
               <a:noFill/>
             </a:ln>
@@ -6690,7 +6869,7 @@
           <a:buFontTx/>
           <a:buNone/>
           <a:tabLst/>
-          <a:defRPr b="0" baseline="0" cap="none" i="0" spc="0" strike="noStrike" sz="1800" u="none" kumimoji="0" normalizeH="0">
+          <a:defRPr kumimoji="0" sz="1800" b="0" i="0" u="none" strike="noStrike" cap="none" spc="0" normalizeH="0" baseline="0">
             <a:ln>
               <a:noFill/>
             </a:ln>
@@ -6716,7 +6895,7 @@
           <a:buFontTx/>
           <a:buNone/>
           <a:tabLst/>
-          <a:defRPr b="0" baseline="0" cap="none" i="0" spc="0" strike="noStrike" sz="1800" u="none" kumimoji="0" normalizeH="0">
+          <a:defRPr kumimoji="0" sz="1800" b="0" i="0" u="none" strike="noStrike" cap="none" spc="0" normalizeH="0" baseline="0">
             <a:ln>
               <a:noFill/>
             </a:ln>
@@ -6742,7 +6921,7 @@
           <a:buFontTx/>
           <a:buNone/>
           <a:tabLst/>
-          <a:defRPr b="0" baseline="0" cap="none" i="0" spc="0" strike="noStrike" sz="1800" u="none" kumimoji="0" normalizeH="0">
+          <a:defRPr kumimoji="0" sz="1800" b="0" i="0" u="none" strike="noStrike" cap="none" spc="0" normalizeH="0" baseline="0">
             <a:ln>
               <a:noFill/>
             </a:ln>
@@ -6768,7 +6947,7 @@
           <a:buFontTx/>
           <a:buNone/>
           <a:tabLst/>
-          <a:defRPr b="0" baseline="0" cap="none" i="0" spc="0" strike="noStrike" sz="1800" u="none" kumimoji="0" normalizeH="0">
+          <a:defRPr kumimoji="0" sz="1800" b="0" i="0" u="none" strike="noStrike" cap="none" spc="0" normalizeH="0" baseline="0">
             <a:ln>
               <a:noFill/>
             </a:ln>
@@ -6794,7 +6973,7 @@
           <a:buFontTx/>
           <a:buNone/>
           <a:tabLst/>
-          <a:defRPr b="0" baseline="0" cap="none" i="0" spc="0" strike="noStrike" sz="1800" u="none" kumimoji="0" normalizeH="0">
+          <a:defRPr kumimoji="0" sz="1800" b="0" i="0" u="none" strike="noStrike" cap="none" spc="0" normalizeH="0" baseline="0">
             <a:ln>
               <a:noFill/>
             </a:ln>
@@ -6807,18 +6986,25 @@
         </a:lvl9pPr>
       </a:lstStyle>
       <a:style>
-        <a:lnRef idx="0"/>
-        <a:fillRef idx="0"/>
-        <a:effectRef idx="0"/>
+        <a:lnRef idx="0">
+          <a:scrgbClr r="0" g="0" b="0"/>
+        </a:lnRef>
+        <a:fillRef idx="0">
+          <a:scrgbClr r="0" g="0" b="0"/>
+        </a:fillRef>
+        <a:effectRef idx="0">
+          <a:scrgbClr r="0" g="0" b="0"/>
+        </a:effectRef>
         <a:fontRef idx="none"/>
       </a:style>
     </a:txDef>
   </a:objectDefaults>
+  <a:extraClrSchemeLst/>
 </a:theme>
 </file>
 
 <file path=ppt/theme/theme2.xml><?xml version="1.0" encoding="utf-8"?>
-<a:theme xmlns:a="http://schemas.openxmlformats.org/drawingml/2006/main" xmlns:r="http://schemas.openxmlformats.org/officeDocument/2006/relationships" name="Showroom">
+<a:theme xmlns:a="http://schemas.openxmlformats.org/drawingml/2006/main" name="Showroom">
   <a:themeElements>
     <a:clrScheme name="Showroom">
       <a:dk1>
@@ -7017,7 +7203,7 @@
         <a:effectLst/>
         <a:sp3d/>
       </a:spPr>
-      <a:bodyPr rot="0" spcFirstLastPara="1" vertOverflow="overflow" horzOverflow="overflow" vert="horz" wrap="square" lIns="50800" tIns="50800" rIns="50800" bIns="50800" numCol="1" spcCol="38100" rtlCol="0" anchor="ctr" upright="0">
+      <a:bodyPr rot="0" spcFirstLastPara="1" vertOverflow="overflow" horzOverflow="overflow" vert="horz" wrap="square" lIns="50800" tIns="50800" rIns="50800" bIns="50800" numCol="1" spcCol="38100" rtlCol="0" anchor="ctr">
         <a:spAutoFit/>
       </a:bodyPr>
       <a:lstStyle>
@@ -7036,7 +7222,7 @@
           <a:buFontTx/>
           <a:buNone/>
           <a:tabLst/>
-          <a:defRPr b="0" baseline="0" cap="none" i="0" spc="0" strike="noStrike" sz="3600" u="none" kumimoji="0" normalizeH="0">
+          <a:defRPr kumimoji="0" sz="3600" b="0" i="0" u="none" strike="noStrike" cap="none" spc="0" normalizeH="0" baseline="0">
             <a:ln>
               <a:noFill/>
             </a:ln>
@@ -7066,7 +7252,7 @@
           <a:buFontTx/>
           <a:buNone/>
           <a:tabLst/>
-          <a:defRPr b="0" baseline="0" cap="none" i="0" spc="0" strike="noStrike" sz="1800" u="none" kumimoji="0" normalizeH="0">
+          <a:defRPr kumimoji="0" sz="1800" b="0" i="0" u="none" strike="noStrike" cap="none" spc="0" normalizeH="0" baseline="0">
             <a:ln>
               <a:noFill/>
             </a:ln>
@@ -7092,7 +7278,7 @@
           <a:buFontTx/>
           <a:buNone/>
           <a:tabLst/>
-          <a:defRPr b="0" baseline="0" cap="none" i="0" spc="0" strike="noStrike" sz="1800" u="none" kumimoji="0" normalizeH="0">
+          <a:defRPr kumimoji="0" sz="1800" b="0" i="0" u="none" strike="noStrike" cap="none" spc="0" normalizeH="0" baseline="0">
             <a:ln>
               <a:noFill/>
             </a:ln>
@@ -7118,7 +7304,7 @@
           <a:buFontTx/>
           <a:buNone/>
           <a:tabLst/>
-          <a:defRPr b="0" baseline="0" cap="none" i="0" spc="0" strike="noStrike" sz="1800" u="none" kumimoji="0" normalizeH="0">
+          <a:defRPr kumimoji="0" sz="1800" b="0" i="0" u="none" strike="noStrike" cap="none" spc="0" normalizeH="0" baseline="0">
             <a:ln>
               <a:noFill/>
             </a:ln>
@@ -7144,7 +7330,7 @@
           <a:buFontTx/>
           <a:buNone/>
           <a:tabLst/>
-          <a:defRPr b="0" baseline="0" cap="none" i="0" spc="0" strike="noStrike" sz="1800" u="none" kumimoji="0" normalizeH="0">
+          <a:defRPr kumimoji="0" sz="1800" b="0" i="0" u="none" strike="noStrike" cap="none" spc="0" normalizeH="0" baseline="0">
             <a:ln>
               <a:noFill/>
             </a:ln>
@@ -7170,7 +7356,7 @@
           <a:buFontTx/>
           <a:buNone/>
           <a:tabLst/>
-          <a:defRPr b="0" baseline="0" cap="none" i="0" spc="0" strike="noStrike" sz="1800" u="none" kumimoji="0" normalizeH="0">
+          <a:defRPr kumimoji="0" sz="1800" b="0" i="0" u="none" strike="noStrike" cap="none" spc="0" normalizeH="0" baseline="0">
             <a:ln>
               <a:noFill/>
             </a:ln>
@@ -7196,7 +7382,7 @@
           <a:buFontTx/>
           <a:buNone/>
           <a:tabLst/>
-          <a:defRPr b="0" baseline="0" cap="none" i="0" spc="0" strike="noStrike" sz="1800" u="none" kumimoji="0" normalizeH="0">
+          <a:defRPr kumimoji="0" sz="1800" b="0" i="0" u="none" strike="noStrike" cap="none" spc="0" normalizeH="0" baseline="0">
             <a:ln>
               <a:noFill/>
             </a:ln>
@@ -7222,7 +7408,7 @@
           <a:buFontTx/>
           <a:buNone/>
           <a:tabLst/>
-          <a:defRPr b="0" baseline="0" cap="none" i="0" spc="0" strike="noStrike" sz="1800" u="none" kumimoji="0" normalizeH="0">
+          <a:defRPr kumimoji="0" sz="1800" b="0" i="0" u="none" strike="noStrike" cap="none" spc="0" normalizeH="0" baseline="0">
             <a:ln>
               <a:noFill/>
             </a:ln>
@@ -7248,7 +7434,7 @@
           <a:buFontTx/>
           <a:buNone/>
           <a:tabLst/>
-          <a:defRPr b="0" baseline="0" cap="none" i="0" spc="0" strike="noStrike" sz="1800" u="none" kumimoji="0" normalizeH="0">
+          <a:defRPr kumimoji="0" sz="1800" b="0" i="0" u="none" strike="noStrike" cap="none" spc="0" normalizeH="0" baseline="0">
             <a:ln>
               <a:noFill/>
             </a:ln>
@@ -7274,7 +7460,7 @@
           <a:buFontTx/>
           <a:buNone/>
           <a:tabLst/>
-          <a:defRPr b="0" baseline="0" cap="none" i="0" spc="0" strike="noStrike" sz="1800" u="none" kumimoji="0" normalizeH="0">
+          <a:defRPr kumimoji="0" sz="1800" b="0" i="0" u="none" strike="noStrike" cap="none" spc="0" normalizeH="0" baseline="0">
             <a:ln>
               <a:noFill/>
             </a:ln>
@@ -7287,9 +7473,15 @@
         </a:lvl9pPr>
       </a:lstStyle>
       <a:style>
-        <a:lnRef idx="0"/>
-        <a:fillRef idx="0"/>
-        <a:effectRef idx="0"/>
+        <a:lnRef idx="0">
+          <a:scrgbClr r="0" g="0" b="0"/>
+        </a:lnRef>
+        <a:fillRef idx="0">
+          <a:scrgbClr r="0" g="0" b="0"/>
+        </a:fillRef>
+        <a:effectRef idx="0">
+          <a:scrgbClr r="0" g="0" b="0"/>
+        </a:effectRef>
         <a:fontRef idx="none"/>
       </a:style>
     </a:spDef>
@@ -7306,7 +7498,7 @@
         <a:effectLst/>
         <a:sp3d/>
       </a:spPr>
-      <a:bodyPr rot="0" spcFirstLastPara="1" vertOverflow="overflow" horzOverflow="overflow" vert="horz" wrap="square" lIns="91439" tIns="45719" rIns="91439" bIns="45719" numCol="1" spcCol="38100" rtlCol="0" anchor="t" upright="0">
+      <a:bodyPr rot="0" spcFirstLastPara="1" vertOverflow="overflow" horzOverflow="overflow" vert="horz" wrap="square" lIns="91439" tIns="45719" rIns="91439" bIns="45719" numCol="1" spcCol="38100" rtlCol="0" anchor="t">
         <a:noAutofit/>
       </a:bodyPr>
       <a:lstStyle>
@@ -7325,7 +7517,7 @@
           <a:buFontTx/>
           <a:buNone/>
           <a:tabLst/>
-          <a:defRPr b="0" baseline="0" cap="none" i="0" spc="0" strike="noStrike" sz="1800" u="none" kumimoji="0" normalizeH="0">
+          <a:defRPr kumimoji="0" sz="1800" b="0" i="0" u="none" strike="noStrike" cap="none" spc="0" normalizeH="0" baseline="0">
             <a:ln>
               <a:noFill/>
             </a:ln>
@@ -7351,7 +7543,7 @@
           <a:buFontTx/>
           <a:buNone/>
           <a:tabLst/>
-          <a:defRPr b="0" baseline="0" cap="none" i="0" spc="0" strike="noStrike" sz="1800" u="none" kumimoji="0" normalizeH="0">
+          <a:defRPr kumimoji="0" sz="1800" b="0" i="0" u="none" strike="noStrike" cap="none" spc="0" normalizeH="0" baseline="0">
             <a:ln>
               <a:noFill/>
             </a:ln>
@@ -7377,7 +7569,7 @@
           <a:buFontTx/>
           <a:buNone/>
           <a:tabLst/>
-          <a:defRPr b="0" baseline="0" cap="none" i="0" spc="0" strike="noStrike" sz="1800" u="none" kumimoji="0" normalizeH="0">
+          <a:defRPr kumimoji="0" sz="1800" b="0" i="0" u="none" strike="noStrike" cap="none" spc="0" normalizeH="0" baseline="0">
             <a:ln>
               <a:noFill/>
             </a:ln>
@@ -7403,7 +7595,7 @@
           <a:buFontTx/>
           <a:buNone/>
           <a:tabLst/>
-          <a:defRPr b="0" baseline="0" cap="none" i="0" spc="0" strike="noStrike" sz="1800" u="none" kumimoji="0" normalizeH="0">
+          <a:defRPr kumimoji="0" sz="1800" b="0" i="0" u="none" strike="noStrike" cap="none" spc="0" normalizeH="0" baseline="0">
             <a:ln>
               <a:noFill/>
             </a:ln>
@@ -7429,7 +7621,7 @@
           <a:buFontTx/>
           <a:buNone/>
           <a:tabLst/>
-          <a:defRPr b="0" baseline="0" cap="none" i="0" spc="0" strike="noStrike" sz="1800" u="none" kumimoji="0" normalizeH="0">
+          <a:defRPr kumimoji="0" sz="1800" b="0" i="0" u="none" strike="noStrike" cap="none" spc="0" normalizeH="0" baseline="0">
             <a:ln>
               <a:noFill/>
             </a:ln>
@@ -7455,7 +7647,7 @@
           <a:buFontTx/>
           <a:buNone/>
           <a:tabLst/>
-          <a:defRPr b="0" baseline="0" cap="none" i="0" spc="0" strike="noStrike" sz="1800" u="none" kumimoji="0" normalizeH="0">
+          <a:defRPr kumimoji="0" sz="1800" b="0" i="0" u="none" strike="noStrike" cap="none" spc="0" normalizeH="0" baseline="0">
             <a:ln>
               <a:noFill/>
             </a:ln>
@@ -7481,7 +7673,7 @@
           <a:buFontTx/>
           <a:buNone/>
           <a:tabLst/>
-          <a:defRPr b="0" baseline="0" cap="none" i="0" spc="0" strike="noStrike" sz="1800" u="none" kumimoji="0" normalizeH="0">
+          <a:defRPr kumimoji="0" sz="1800" b="0" i="0" u="none" strike="noStrike" cap="none" spc="0" normalizeH="0" baseline="0">
             <a:ln>
               <a:noFill/>
             </a:ln>
@@ -7507,7 +7699,7 @@
           <a:buFontTx/>
           <a:buNone/>
           <a:tabLst/>
-          <a:defRPr b="0" baseline="0" cap="none" i="0" spc="0" strike="noStrike" sz="1800" u="none" kumimoji="0" normalizeH="0">
+          <a:defRPr kumimoji="0" sz="1800" b="0" i="0" u="none" strike="noStrike" cap="none" spc="0" normalizeH="0" baseline="0">
             <a:ln>
               <a:noFill/>
             </a:ln>
@@ -7533,7 +7725,7 @@
           <a:buFontTx/>
           <a:buNone/>
           <a:tabLst/>
-          <a:defRPr b="0" baseline="0" cap="none" i="0" spc="0" strike="noStrike" sz="1800" u="none" kumimoji="0" normalizeH="0">
+          <a:defRPr kumimoji="0" sz="1800" b="0" i="0" u="none" strike="noStrike" cap="none" spc="0" normalizeH="0" baseline="0">
             <a:ln>
               <a:noFill/>
             </a:ln>
@@ -7559,7 +7751,7 @@
           <a:buFontTx/>
           <a:buNone/>
           <a:tabLst/>
-          <a:defRPr b="0" baseline="0" cap="none" i="0" spc="0" strike="noStrike" sz="1800" u="none" kumimoji="0" normalizeH="0">
+          <a:defRPr kumimoji="0" sz="1800" b="0" i="0" u="none" strike="noStrike" cap="none" spc="0" normalizeH="0" baseline="0">
             <a:ln>
               <a:noFill/>
             </a:ln>
@@ -7572,9 +7764,15 @@
         </a:lvl9pPr>
       </a:lstStyle>
       <a:style>
-        <a:lnRef idx="0"/>
-        <a:fillRef idx="0"/>
-        <a:effectRef idx="0"/>
+        <a:lnRef idx="0">
+          <a:scrgbClr r="0" g="0" b="0"/>
+        </a:lnRef>
+        <a:fillRef idx="0">
+          <a:scrgbClr r="0" g="0" b="0"/>
+        </a:fillRef>
+        <a:effectRef idx="0">
+          <a:scrgbClr r="0" g="0" b="0"/>
+        </a:effectRef>
         <a:fontRef idx="none"/>
       </a:style>
     </a:lnDef>
@@ -7588,7 +7786,7 @@
         <a:effectLst/>
         <a:sp3d/>
       </a:spPr>
-      <a:bodyPr rot="0" spcFirstLastPara="1" vertOverflow="overflow" horzOverflow="overflow" vert="horz" wrap="square" lIns="50800" tIns="50800" rIns="50800" bIns="50800" numCol="1" spcCol="38100" rtlCol="0" anchor="ctr" upright="0">
+      <a:bodyPr rot="0" spcFirstLastPara="1" vertOverflow="overflow" horzOverflow="overflow" vert="horz" wrap="square" lIns="50800" tIns="50800" rIns="50800" bIns="50800" numCol="1" spcCol="38100" rtlCol="0" anchor="ctr">
         <a:spAutoFit/>
       </a:bodyPr>
       <a:lstStyle>
@@ -7607,7 +7805,7 @@
           <a:buFontTx/>
           <a:buNone/>
           <a:tabLst/>
-          <a:defRPr b="0" baseline="0" cap="none" i="0" spc="0" strike="noStrike" sz="3600" u="none" kumimoji="0" normalizeH="0">
+          <a:defRPr kumimoji="0" sz="3600" b="0" i="0" u="none" strike="noStrike" cap="none" spc="0" normalizeH="0" baseline="0">
             <a:ln>
               <a:noFill/>
             </a:ln>
@@ -7637,7 +7835,7 @@
           <a:buFontTx/>
           <a:buNone/>
           <a:tabLst/>
-          <a:defRPr b="0" baseline="0" cap="none" i="0" spc="0" strike="noStrike" sz="1800" u="none" kumimoji="0" normalizeH="0">
+          <a:defRPr kumimoji="0" sz="1800" b="0" i="0" u="none" strike="noStrike" cap="none" spc="0" normalizeH="0" baseline="0">
             <a:ln>
               <a:noFill/>
             </a:ln>
@@ -7663,7 +7861,7 @@
           <a:buFontTx/>
           <a:buNone/>
           <a:tabLst/>
-          <a:defRPr b="0" baseline="0" cap="none" i="0" spc="0" strike="noStrike" sz="1800" u="none" kumimoji="0" normalizeH="0">
+          <a:defRPr kumimoji="0" sz="1800" b="0" i="0" u="none" strike="noStrike" cap="none" spc="0" normalizeH="0" baseline="0">
             <a:ln>
               <a:noFill/>
             </a:ln>
@@ -7689,7 +7887,7 @@
           <a:buFontTx/>
           <a:buNone/>
           <a:tabLst/>
-          <a:defRPr b="0" baseline="0" cap="none" i="0" spc="0" strike="noStrike" sz="1800" u="none" kumimoji="0" normalizeH="0">
+          <a:defRPr kumimoji="0" sz="1800" b="0" i="0" u="none" strike="noStrike" cap="none" spc="0" normalizeH="0" baseline="0">
             <a:ln>
               <a:noFill/>
             </a:ln>
@@ -7715,7 +7913,7 @@
           <a:buFontTx/>
           <a:buNone/>
           <a:tabLst/>
-          <a:defRPr b="0" baseline="0" cap="none" i="0" spc="0" strike="noStrike" sz="1800" u="none" kumimoji="0" normalizeH="0">
+          <a:defRPr kumimoji="0" sz="1800" b="0" i="0" u="none" strike="noStrike" cap="none" spc="0" normalizeH="0" baseline="0">
             <a:ln>
               <a:noFill/>
             </a:ln>
@@ -7741,7 +7939,7 @@
           <a:buFontTx/>
           <a:buNone/>
           <a:tabLst/>
-          <a:defRPr b="0" baseline="0" cap="none" i="0" spc="0" strike="noStrike" sz="1800" u="none" kumimoji="0" normalizeH="0">
+          <a:defRPr kumimoji="0" sz="1800" b="0" i="0" u="none" strike="noStrike" cap="none" spc="0" normalizeH="0" baseline="0">
             <a:ln>
               <a:noFill/>
             </a:ln>
@@ -7767,7 +7965,7 @@
           <a:buFontTx/>
           <a:buNone/>
           <a:tabLst/>
-          <a:defRPr b="0" baseline="0" cap="none" i="0" spc="0" strike="noStrike" sz="1800" u="none" kumimoji="0" normalizeH="0">
+          <a:defRPr kumimoji="0" sz="1800" b="0" i="0" u="none" strike="noStrike" cap="none" spc="0" normalizeH="0" baseline="0">
             <a:ln>
               <a:noFill/>
             </a:ln>
@@ -7793,7 +7991,7 @@
           <a:buFontTx/>
           <a:buNone/>
           <a:tabLst/>
-          <a:defRPr b="0" baseline="0" cap="none" i="0" spc="0" strike="noStrike" sz="1800" u="none" kumimoji="0" normalizeH="0">
+          <a:defRPr kumimoji="0" sz="1800" b="0" i="0" u="none" strike="noStrike" cap="none" spc="0" normalizeH="0" baseline="0">
             <a:ln>
               <a:noFill/>
             </a:ln>
@@ -7819,7 +8017,7 @@
           <a:buFontTx/>
           <a:buNone/>
           <a:tabLst/>
-          <a:defRPr b="0" baseline="0" cap="none" i="0" spc="0" strike="noStrike" sz="1800" u="none" kumimoji="0" normalizeH="0">
+          <a:defRPr kumimoji="0" sz="1800" b="0" i="0" u="none" strike="noStrike" cap="none" spc="0" normalizeH="0" baseline="0">
             <a:ln>
               <a:noFill/>
             </a:ln>
@@ -7845,7 +8043,7 @@
           <a:buFontTx/>
           <a:buNone/>
           <a:tabLst/>
-          <a:defRPr b="0" baseline="0" cap="none" i="0" spc="0" strike="noStrike" sz="1800" u="none" kumimoji="0" normalizeH="0">
+          <a:defRPr kumimoji="0" sz="1800" b="0" i="0" u="none" strike="noStrike" cap="none" spc="0" normalizeH="0" baseline="0">
             <a:ln>
               <a:noFill/>
             </a:ln>
@@ -7858,12 +8056,19 @@
         </a:lvl9pPr>
       </a:lstStyle>
       <a:style>
-        <a:lnRef idx="0"/>
-        <a:fillRef idx="0"/>
-        <a:effectRef idx="0"/>
+        <a:lnRef idx="0">
+          <a:scrgbClr r="0" g="0" b="0"/>
+        </a:lnRef>
+        <a:fillRef idx="0">
+          <a:scrgbClr r="0" g="0" b="0"/>
+        </a:fillRef>
+        <a:effectRef idx="0">
+          <a:scrgbClr r="0" g="0" b="0"/>
+        </a:effectRef>
         <a:fontRef idx="none"/>
       </a:style>
     </a:txDef>
   </a:objectDefaults>
+  <a:extraClrSchemeLst/>
 </a:theme>
 </file>
</xml_diff>